<commit_message>
Challenge 2 - Presentation
</commit_message>
<xml_diff>
--- a/Challenge2_GDACapstoneProject_Bellabeat_202209.pptx
+++ b/Challenge2_GDACapstoneProject_Bellabeat_202209.pptx
@@ -5,40 +5,41 @@
     <p:sldMasterId id="2147483659" r:id="rId1"/>
   </p:sldMasterIdLst>
   <p:notesMasterIdLst>
-    <p:notesMasterId r:id="rId23"/>
+    <p:notesMasterId r:id="rId24"/>
   </p:notesMasterIdLst>
   <p:sldIdLst>
     <p:sldId id="256" r:id="rId2"/>
-    <p:sldId id="257" r:id="rId3"/>
-    <p:sldId id="258" r:id="rId4"/>
-    <p:sldId id="259" r:id="rId5"/>
-    <p:sldId id="260" r:id="rId6"/>
-    <p:sldId id="261" r:id="rId7"/>
-    <p:sldId id="262" r:id="rId8"/>
-    <p:sldId id="263" r:id="rId9"/>
-    <p:sldId id="264" r:id="rId10"/>
-    <p:sldId id="265" r:id="rId11"/>
-    <p:sldId id="266" r:id="rId12"/>
-    <p:sldId id="267" r:id="rId13"/>
-    <p:sldId id="268" r:id="rId14"/>
-    <p:sldId id="269" r:id="rId15"/>
-    <p:sldId id="270" r:id="rId16"/>
-    <p:sldId id="271" r:id="rId17"/>
-    <p:sldId id="272" r:id="rId18"/>
-    <p:sldId id="273" r:id="rId19"/>
-    <p:sldId id="274" r:id="rId20"/>
-    <p:sldId id="275" r:id="rId21"/>
-    <p:sldId id="276" r:id="rId22"/>
+    <p:sldId id="277" r:id="rId3"/>
+    <p:sldId id="287" r:id="rId4"/>
+    <p:sldId id="258" r:id="rId5"/>
+    <p:sldId id="259" r:id="rId6"/>
+    <p:sldId id="260" r:id="rId7"/>
+    <p:sldId id="261" r:id="rId8"/>
+    <p:sldId id="262" r:id="rId9"/>
+    <p:sldId id="263" r:id="rId10"/>
+    <p:sldId id="264" r:id="rId11"/>
+    <p:sldId id="265" r:id="rId12"/>
+    <p:sldId id="266" r:id="rId13"/>
+    <p:sldId id="267" r:id="rId14"/>
+    <p:sldId id="268" r:id="rId15"/>
+    <p:sldId id="269" r:id="rId16"/>
+    <p:sldId id="270" r:id="rId17"/>
+    <p:sldId id="271" r:id="rId18"/>
+    <p:sldId id="272" r:id="rId19"/>
+    <p:sldId id="273" r:id="rId20"/>
+    <p:sldId id="274" r:id="rId21"/>
+    <p:sldId id="275" r:id="rId22"/>
+    <p:sldId id="276" r:id="rId23"/>
   </p:sldIdLst>
   <p:sldSz cx="9144000" cy="5143500" type="screen16x9"/>
   <p:notesSz cx="6858000" cy="9144000"/>
   <p:embeddedFontLst>
     <p:embeddedFont>
       <p:font typeface="Open Sans" panose="020B0606030504020204" pitchFamily="34" charset="0"/>
-      <p:regular r:id="rId24"/>
-      <p:bold r:id="rId25"/>
-      <p:italic r:id="rId26"/>
-      <p:boldItalic r:id="rId27"/>
+      <p:regular r:id="rId25"/>
+      <p:bold r:id="rId26"/>
+      <p:italic r:id="rId27"/>
+      <p:boldItalic r:id="rId28"/>
     </p:embeddedFont>
   </p:embeddedFontLst>
   <p:defaultTextStyle>
@@ -839,6 +840,110 @@
   <p:cSld>
     <p:spTree>
       <p:nvGrpSpPr>
+        <p:cNvPr id="1" name="Shape 142"/>
+        <p:cNvGrpSpPr/>
+        <p:nvPr/>
+      </p:nvGrpSpPr>
+      <p:grpSpPr>
+        <a:xfrm>
+          <a:off x="0" y="0"/>
+          <a:ext cx="0" cy="0"/>
+          <a:chOff x="0" y="0"/>
+          <a:chExt cx="0" cy="0"/>
+        </a:xfrm>
+      </p:grpSpPr>
+      <p:sp>
+        <p:nvSpPr>
+          <p:cNvPr id="143" name="Google Shape;143;g155d01b7735_0_71:notes"/>
+          <p:cNvSpPr>
+            <a:spLocks noGrp="1" noRot="1" noChangeAspect="1"/>
+          </p:cNvSpPr>
+          <p:nvPr>
+            <p:ph type="sldImg" idx="2"/>
+          </p:nvPr>
+        </p:nvSpPr>
+        <p:spPr>
+          <a:xfrm>
+            <a:off x="381300" y="685800"/>
+            <a:ext cx="6096000" cy="3429000"/>
+          </a:xfrm>
+          <a:custGeom>
+            <a:avLst/>
+            <a:gdLst/>
+            <a:ahLst/>
+            <a:cxnLst/>
+            <a:rect l="l" t="t" r="r" b="b"/>
+            <a:pathLst>
+              <a:path w="120000" h="120000" extrusionOk="0">
+                <a:moveTo>
+                  <a:pt x="0" y="0"/>
+                </a:moveTo>
+                <a:lnTo>
+                  <a:pt x="120000" y="0"/>
+                </a:lnTo>
+                <a:lnTo>
+                  <a:pt x="120000" y="120000"/>
+                </a:lnTo>
+                <a:lnTo>
+                  <a:pt x="0" y="120000"/>
+                </a:lnTo>
+                <a:close/>
+              </a:path>
+            </a:pathLst>
+          </a:custGeom>
+        </p:spPr>
+      </p:sp>
+      <p:sp>
+        <p:nvSpPr>
+          <p:cNvPr id="144" name="Google Shape;144;g155d01b7735_0_71:notes"/>
+          <p:cNvSpPr txBox="1">
+            <a:spLocks noGrp="1"/>
+          </p:cNvSpPr>
+          <p:nvPr>
+            <p:ph type="body" idx="1"/>
+          </p:nvPr>
+        </p:nvSpPr>
+        <p:spPr>
+          <a:xfrm>
+            <a:off x="685800" y="4343400"/>
+            <a:ext cx="5486400" cy="4114800"/>
+          </a:xfrm>
+          <a:prstGeom prst="rect">
+            <a:avLst/>
+          </a:prstGeom>
+        </p:spPr>
+        <p:txBody>
+          <a:bodyPr spcFirstLastPara="1" wrap="square" lIns="91425" tIns="91425" rIns="91425" bIns="91425" anchor="t" anchorCtr="0">
+            <a:noAutofit/>
+          </a:bodyPr>
+          <a:lstStyle/>
+          <a:p>
+            <a:pPr marL="0" lvl="0" indent="0" algn="l" rtl="0">
+              <a:spcBef>
+                <a:spcPts val="0"/>
+              </a:spcBef>
+              <a:spcAft>
+                <a:spcPts val="0"/>
+              </a:spcAft>
+              <a:buNone/>
+            </a:pPr>
+            <a:endParaRPr/>
+          </a:p>
+        </p:txBody>
+      </p:sp>
+    </p:spTree>
+  </p:cSld>
+  <p:clrMapOvr>
+    <a:masterClrMapping/>
+  </p:clrMapOvr>
+</p:notes>
+</file>
+
+<file path=ppt/notesSlides/notesSlide11.xml><?xml version="1.0" encoding="utf-8"?>
+<p:notes xmlns:a="http://schemas.openxmlformats.org/drawingml/2006/main" xmlns:r="http://schemas.openxmlformats.org/officeDocument/2006/relationships" xmlns:p="http://schemas.openxmlformats.org/presentationml/2006/main" showMasterSp="0" showMasterPhAnim="0">
+  <p:cSld>
+    <p:spTree>
+      <p:nvGrpSpPr>
         <p:cNvPr id="1" name="Shape 151"/>
         <p:cNvGrpSpPr/>
         <p:nvPr/>
@@ -938,7 +1043,7 @@
 </p:notes>
 </file>
 
-<file path=ppt/notesSlides/notesSlide11.xml><?xml version="1.0" encoding="utf-8"?>
+<file path=ppt/notesSlides/notesSlide12.xml><?xml version="1.0" encoding="utf-8"?>
 <p:notes xmlns:a="http://schemas.openxmlformats.org/drawingml/2006/main" xmlns:r="http://schemas.openxmlformats.org/officeDocument/2006/relationships" xmlns:p="http://schemas.openxmlformats.org/presentationml/2006/main" showMasterSp="0" showMasterPhAnim="0">
   <p:cSld>
     <p:spTree>
@@ -1042,7 +1147,7 @@
 </p:notes>
 </file>
 
-<file path=ppt/notesSlides/notesSlide12.xml><?xml version="1.0" encoding="utf-8"?>
+<file path=ppt/notesSlides/notesSlide13.xml><?xml version="1.0" encoding="utf-8"?>
 <p:notes xmlns:a="http://schemas.openxmlformats.org/drawingml/2006/main" xmlns:r="http://schemas.openxmlformats.org/officeDocument/2006/relationships" xmlns:p="http://schemas.openxmlformats.org/presentationml/2006/main" showMasterSp="0" showMasterPhAnim="0">
   <p:cSld>
     <p:spTree>
@@ -1146,7 +1251,7 @@
 </p:notes>
 </file>
 
-<file path=ppt/notesSlides/notesSlide13.xml><?xml version="1.0" encoding="utf-8"?>
+<file path=ppt/notesSlides/notesSlide14.xml><?xml version="1.0" encoding="utf-8"?>
 <p:notes xmlns:a="http://schemas.openxmlformats.org/drawingml/2006/main" xmlns:r="http://schemas.openxmlformats.org/officeDocument/2006/relationships" xmlns:p="http://schemas.openxmlformats.org/presentationml/2006/main" showMasterSp="0" showMasterPhAnim="0">
   <p:cSld>
     <p:spTree>
@@ -1250,7 +1355,7 @@
 </p:notes>
 </file>
 
-<file path=ppt/notesSlides/notesSlide14.xml><?xml version="1.0" encoding="utf-8"?>
+<file path=ppt/notesSlides/notesSlide15.xml><?xml version="1.0" encoding="utf-8"?>
 <p:notes xmlns:a="http://schemas.openxmlformats.org/drawingml/2006/main" xmlns:r="http://schemas.openxmlformats.org/officeDocument/2006/relationships" xmlns:p="http://schemas.openxmlformats.org/presentationml/2006/main" showMasterSp="0" showMasterPhAnim="0">
   <p:cSld>
     <p:spTree>
@@ -1354,7 +1459,7 @@
 </p:notes>
 </file>
 
-<file path=ppt/notesSlides/notesSlide15.xml><?xml version="1.0" encoding="utf-8"?>
+<file path=ppt/notesSlides/notesSlide16.xml><?xml version="1.0" encoding="utf-8"?>
 <p:notes xmlns:a="http://schemas.openxmlformats.org/drawingml/2006/main" xmlns:r="http://schemas.openxmlformats.org/officeDocument/2006/relationships" xmlns:p="http://schemas.openxmlformats.org/presentationml/2006/main" showMasterSp="0" showMasterPhAnim="0">
   <p:cSld>
     <p:spTree>
@@ -1458,7 +1563,7 @@
 </p:notes>
 </file>
 
-<file path=ppt/notesSlides/notesSlide16.xml><?xml version="1.0" encoding="utf-8"?>
+<file path=ppt/notesSlides/notesSlide17.xml><?xml version="1.0" encoding="utf-8"?>
 <p:notes xmlns:a="http://schemas.openxmlformats.org/drawingml/2006/main" xmlns:r="http://schemas.openxmlformats.org/officeDocument/2006/relationships" xmlns:p="http://schemas.openxmlformats.org/presentationml/2006/main" showMasterSp="0" showMasterPhAnim="0">
   <p:cSld>
     <p:spTree>
@@ -1562,7 +1667,7 @@
 </p:notes>
 </file>
 
-<file path=ppt/notesSlides/notesSlide17.xml><?xml version="1.0" encoding="utf-8"?>
+<file path=ppt/notesSlides/notesSlide18.xml><?xml version="1.0" encoding="utf-8"?>
 <p:notes xmlns:a="http://schemas.openxmlformats.org/drawingml/2006/main" xmlns:r="http://schemas.openxmlformats.org/officeDocument/2006/relationships" xmlns:p="http://schemas.openxmlformats.org/presentationml/2006/main" showMasterSp="0" showMasterPhAnim="0">
   <p:cSld>
     <p:spTree>
@@ -1666,7 +1771,7 @@
 </p:notes>
 </file>
 
-<file path=ppt/notesSlides/notesSlide18.xml><?xml version="1.0" encoding="utf-8"?>
+<file path=ppt/notesSlides/notesSlide19.xml><?xml version="1.0" encoding="utf-8"?>
 <p:notes xmlns:a="http://schemas.openxmlformats.org/drawingml/2006/main" xmlns:r="http://schemas.openxmlformats.org/officeDocument/2006/relationships" xmlns:p="http://schemas.openxmlformats.org/presentationml/2006/main" showMasterSp="0" showMasterPhAnim="0">
   <p:cSld>
     <p:spTree>
@@ -1727,110 +1832,6 @@
       <p:sp>
         <p:nvSpPr>
           <p:cNvPr id="233" name="Google Shape;233;g155d01b7735_0_122:notes"/>
-          <p:cNvSpPr txBox="1">
-            <a:spLocks noGrp="1"/>
-          </p:cNvSpPr>
-          <p:nvPr>
-            <p:ph type="body" idx="1"/>
-          </p:nvPr>
-        </p:nvSpPr>
-        <p:spPr>
-          <a:xfrm>
-            <a:off x="685800" y="4343400"/>
-            <a:ext cx="5486400" cy="4114800"/>
-          </a:xfrm>
-          <a:prstGeom prst="rect">
-            <a:avLst/>
-          </a:prstGeom>
-        </p:spPr>
-        <p:txBody>
-          <a:bodyPr spcFirstLastPara="1" wrap="square" lIns="91425" tIns="91425" rIns="91425" bIns="91425" anchor="t" anchorCtr="0">
-            <a:noAutofit/>
-          </a:bodyPr>
-          <a:lstStyle/>
-          <a:p>
-            <a:pPr marL="0" lvl="0" indent="0" algn="l" rtl="0">
-              <a:spcBef>
-                <a:spcPts val="0"/>
-              </a:spcBef>
-              <a:spcAft>
-                <a:spcPts val="0"/>
-              </a:spcAft>
-              <a:buNone/>
-            </a:pPr>
-            <a:endParaRPr/>
-          </a:p>
-        </p:txBody>
-      </p:sp>
-    </p:spTree>
-  </p:cSld>
-  <p:clrMapOvr>
-    <a:masterClrMapping/>
-  </p:clrMapOvr>
-</p:notes>
-</file>
-
-<file path=ppt/notesSlides/notesSlide19.xml><?xml version="1.0" encoding="utf-8"?>
-<p:notes xmlns:a="http://schemas.openxmlformats.org/drawingml/2006/main" xmlns:r="http://schemas.openxmlformats.org/officeDocument/2006/relationships" xmlns:p="http://schemas.openxmlformats.org/presentationml/2006/main" showMasterSp="0" showMasterPhAnim="0">
-  <p:cSld>
-    <p:spTree>
-      <p:nvGrpSpPr>
-        <p:cNvPr id="1" name="Shape 260"/>
-        <p:cNvGrpSpPr/>
-        <p:nvPr/>
-      </p:nvGrpSpPr>
-      <p:grpSpPr>
-        <a:xfrm>
-          <a:off x="0" y="0"/>
-          <a:ext cx="0" cy="0"/>
-          <a:chOff x="0" y="0"/>
-          <a:chExt cx="0" cy="0"/>
-        </a:xfrm>
-      </p:grpSpPr>
-      <p:sp>
-        <p:nvSpPr>
-          <p:cNvPr id="261" name="Google Shape;261;g15414c2f9ae_0_146:notes"/>
-          <p:cNvSpPr>
-            <a:spLocks noGrp="1" noRot="1" noChangeAspect="1"/>
-          </p:cNvSpPr>
-          <p:nvPr>
-            <p:ph type="sldImg" idx="2"/>
-          </p:nvPr>
-        </p:nvSpPr>
-        <p:spPr>
-          <a:xfrm>
-            <a:off x="381300" y="685800"/>
-            <a:ext cx="6096000" cy="3429000"/>
-          </a:xfrm>
-          <a:custGeom>
-            <a:avLst/>
-            <a:gdLst/>
-            <a:ahLst/>
-            <a:cxnLst/>
-            <a:rect l="l" t="t" r="r" b="b"/>
-            <a:pathLst>
-              <a:path w="120000" h="120000" extrusionOk="0">
-                <a:moveTo>
-                  <a:pt x="0" y="0"/>
-                </a:moveTo>
-                <a:lnTo>
-                  <a:pt x="120000" y="0"/>
-                </a:lnTo>
-                <a:lnTo>
-                  <a:pt x="120000" y="120000"/>
-                </a:lnTo>
-                <a:lnTo>
-                  <a:pt x="0" y="120000"/>
-                </a:lnTo>
-                <a:close/>
-              </a:path>
-            </a:pathLst>
-          </a:custGeom>
-        </p:spPr>
-      </p:sp>
-      <p:sp>
-        <p:nvSpPr>
-          <p:cNvPr id="262" name="Google Shape;262;g15414c2f9ae_0_146:notes"/>
           <p:cNvSpPr txBox="1">
             <a:spLocks noGrp="1"/>
           </p:cNvSpPr>
@@ -1903,7 +1904,7 @@
         </p:nvSpPr>
         <p:spPr>
           <a:xfrm>
-            <a:off x="381300" y="685800"/>
+            <a:off x="381000" y="685800"/>
             <a:ext cx="6096000" cy="3429000"/>
           </a:xfrm>
           <a:custGeom>
@@ -1971,6 +1972,11 @@
         </p:txBody>
       </p:sp>
     </p:spTree>
+    <p:extLst>
+      <p:ext uri="{BB962C8B-B14F-4D97-AF65-F5344CB8AC3E}">
+        <p14:creationId xmlns:p14="http://schemas.microsoft.com/office/powerpoint/2010/main" val="1672669609"/>
+      </p:ext>
+    </p:extLst>
   </p:cSld>
   <p:clrMapOvr>
     <a:masterClrMapping/>
@@ -1979,6 +1985,110 @@
 </file>
 
 <file path=ppt/notesSlides/notesSlide20.xml><?xml version="1.0" encoding="utf-8"?>
+<p:notes xmlns:a="http://schemas.openxmlformats.org/drawingml/2006/main" xmlns:r="http://schemas.openxmlformats.org/officeDocument/2006/relationships" xmlns:p="http://schemas.openxmlformats.org/presentationml/2006/main" showMasterSp="0" showMasterPhAnim="0">
+  <p:cSld>
+    <p:spTree>
+      <p:nvGrpSpPr>
+        <p:cNvPr id="1" name="Shape 260"/>
+        <p:cNvGrpSpPr/>
+        <p:nvPr/>
+      </p:nvGrpSpPr>
+      <p:grpSpPr>
+        <a:xfrm>
+          <a:off x="0" y="0"/>
+          <a:ext cx="0" cy="0"/>
+          <a:chOff x="0" y="0"/>
+          <a:chExt cx="0" cy="0"/>
+        </a:xfrm>
+      </p:grpSpPr>
+      <p:sp>
+        <p:nvSpPr>
+          <p:cNvPr id="261" name="Google Shape;261;g15414c2f9ae_0_146:notes"/>
+          <p:cNvSpPr>
+            <a:spLocks noGrp="1" noRot="1" noChangeAspect="1"/>
+          </p:cNvSpPr>
+          <p:nvPr>
+            <p:ph type="sldImg" idx="2"/>
+          </p:nvPr>
+        </p:nvSpPr>
+        <p:spPr>
+          <a:xfrm>
+            <a:off x="381300" y="685800"/>
+            <a:ext cx="6096000" cy="3429000"/>
+          </a:xfrm>
+          <a:custGeom>
+            <a:avLst/>
+            <a:gdLst/>
+            <a:ahLst/>
+            <a:cxnLst/>
+            <a:rect l="l" t="t" r="r" b="b"/>
+            <a:pathLst>
+              <a:path w="120000" h="120000" extrusionOk="0">
+                <a:moveTo>
+                  <a:pt x="0" y="0"/>
+                </a:moveTo>
+                <a:lnTo>
+                  <a:pt x="120000" y="0"/>
+                </a:lnTo>
+                <a:lnTo>
+                  <a:pt x="120000" y="120000"/>
+                </a:lnTo>
+                <a:lnTo>
+                  <a:pt x="0" y="120000"/>
+                </a:lnTo>
+                <a:close/>
+              </a:path>
+            </a:pathLst>
+          </a:custGeom>
+        </p:spPr>
+      </p:sp>
+      <p:sp>
+        <p:nvSpPr>
+          <p:cNvPr id="262" name="Google Shape;262;g15414c2f9ae_0_146:notes"/>
+          <p:cNvSpPr txBox="1">
+            <a:spLocks noGrp="1"/>
+          </p:cNvSpPr>
+          <p:nvPr>
+            <p:ph type="body" idx="1"/>
+          </p:nvPr>
+        </p:nvSpPr>
+        <p:spPr>
+          <a:xfrm>
+            <a:off x="685800" y="4343400"/>
+            <a:ext cx="5486400" cy="4114800"/>
+          </a:xfrm>
+          <a:prstGeom prst="rect">
+            <a:avLst/>
+          </a:prstGeom>
+        </p:spPr>
+        <p:txBody>
+          <a:bodyPr spcFirstLastPara="1" wrap="square" lIns="91425" tIns="91425" rIns="91425" bIns="91425" anchor="t" anchorCtr="0">
+            <a:noAutofit/>
+          </a:bodyPr>
+          <a:lstStyle/>
+          <a:p>
+            <a:pPr marL="0" lvl="0" indent="0" algn="l" rtl="0">
+              <a:spcBef>
+                <a:spcPts val="0"/>
+              </a:spcBef>
+              <a:spcAft>
+                <a:spcPts val="0"/>
+              </a:spcAft>
+              <a:buNone/>
+            </a:pPr>
+            <a:endParaRPr/>
+          </a:p>
+        </p:txBody>
+      </p:sp>
+    </p:spTree>
+  </p:cSld>
+  <p:clrMapOvr>
+    <a:masterClrMapping/>
+  </p:clrMapOvr>
+</p:notes>
+</file>
+
+<file path=ppt/notesSlides/notesSlide21.xml><?xml version="1.0" encoding="utf-8"?>
 <p:notes xmlns:a="http://schemas.openxmlformats.org/drawingml/2006/main" xmlns:r="http://schemas.openxmlformats.org/officeDocument/2006/relationships" xmlns:p="http://schemas.openxmlformats.org/presentationml/2006/main" showMasterSp="0" showMasterPhAnim="0">
   <p:cSld>
     <p:spTree>
@@ -2082,7 +2192,7 @@
 </p:notes>
 </file>
 
-<file path=ppt/notesSlides/notesSlide21.xml><?xml version="1.0" encoding="utf-8"?>
+<file path=ppt/notesSlides/notesSlide22.xml><?xml version="1.0" encoding="utf-8"?>
 <p:notes xmlns:a="http://schemas.openxmlformats.org/drawingml/2006/main" xmlns:r="http://schemas.openxmlformats.org/officeDocument/2006/relationships" xmlns:p="http://schemas.openxmlformats.org/presentationml/2006/main" showMasterSp="0" showMasterPhAnim="0">
   <p:cSld>
     <p:spTree>
@@ -2191,6 +2301,115 @@
   <p:cSld>
     <p:spTree>
       <p:nvGrpSpPr>
+        <p:cNvPr id="1" name="Shape 98"/>
+        <p:cNvGrpSpPr/>
+        <p:nvPr/>
+      </p:nvGrpSpPr>
+      <p:grpSpPr>
+        <a:xfrm>
+          <a:off x="0" y="0"/>
+          <a:ext cx="0" cy="0"/>
+          <a:chOff x="0" y="0"/>
+          <a:chExt cx="0" cy="0"/>
+        </a:xfrm>
+      </p:grpSpPr>
+      <p:sp>
+        <p:nvSpPr>
+          <p:cNvPr id="99" name="Google Shape;99;g15414c2f9ae_0_82:notes"/>
+          <p:cNvSpPr>
+            <a:spLocks noGrp="1" noRot="1" noChangeAspect="1"/>
+          </p:cNvSpPr>
+          <p:nvPr>
+            <p:ph type="sldImg" idx="2"/>
+          </p:nvPr>
+        </p:nvSpPr>
+        <p:spPr>
+          <a:xfrm>
+            <a:off x="381000" y="685800"/>
+            <a:ext cx="6096000" cy="3429000"/>
+          </a:xfrm>
+          <a:custGeom>
+            <a:avLst/>
+            <a:gdLst/>
+            <a:ahLst/>
+            <a:cxnLst/>
+            <a:rect l="l" t="t" r="r" b="b"/>
+            <a:pathLst>
+              <a:path w="120000" h="120000" extrusionOk="0">
+                <a:moveTo>
+                  <a:pt x="0" y="0"/>
+                </a:moveTo>
+                <a:lnTo>
+                  <a:pt x="120000" y="0"/>
+                </a:lnTo>
+                <a:lnTo>
+                  <a:pt x="120000" y="120000"/>
+                </a:lnTo>
+                <a:lnTo>
+                  <a:pt x="0" y="120000"/>
+                </a:lnTo>
+                <a:close/>
+              </a:path>
+            </a:pathLst>
+          </a:custGeom>
+        </p:spPr>
+      </p:sp>
+      <p:sp>
+        <p:nvSpPr>
+          <p:cNvPr id="100" name="Google Shape;100;g15414c2f9ae_0_82:notes"/>
+          <p:cNvSpPr txBox="1">
+            <a:spLocks noGrp="1"/>
+          </p:cNvSpPr>
+          <p:nvPr>
+            <p:ph type="body" idx="1"/>
+          </p:nvPr>
+        </p:nvSpPr>
+        <p:spPr>
+          <a:xfrm>
+            <a:off x="685800" y="4343400"/>
+            <a:ext cx="5486400" cy="4114800"/>
+          </a:xfrm>
+          <a:prstGeom prst="rect">
+            <a:avLst/>
+          </a:prstGeom>
+        </p:spPr>
+        <p:txBody>
+          <a:bodyPr spcFirstLastPara="1" wrap="square" lIns="91425" tIns="91425" rIns="91425" bIns="91425" anchor="t" anchorCtr="0">
+            <a:noAutofit/>
+          </a:bodyPr>
+          <a:lstStyle/>
+          <a:p>
+            <a:pPr marL="0" lvl="0" indent="0" algn="l" rtl="0">
+              <a:spcBef>
+                <a:spcPts val="0"/>
+              </a:spcBef>
+              <a:spcAft>
+                <a:spcPts val="0"/>
+              </a:spcAft>
+              <a:buNone/>
+            </a:pPr>
+            <a:endParaRPr/>
+          </a:p>
+        </p:txBody>
+      </p:sp>
+    </p:spTree>
+    <p:extLst>
+      <p:ext uri="{BB962C8B-B14F-4D97-AF65-F5344CB8AC3E}">
+        <p14:creationId xmlns:p14="http://schemas.microsoft.com/office/powerpoint/2010/main" val="2106408089"/>
+      </p:ext>
+    </p:extLst>
+  </p:cSld>
+  <p:clrMapOvr>
+    <a:masterClrMapping/>
+  </p:clrMapOvr>
+</p:notes>
+</file>
+
+<file path=ppt/notesSlides/notesSlide4.xml><?xml version="1.0" encoding="utf-8"?>
+<p:notes xmlns:a="http://schemas.openxmlformats.org/drawingml/2006/main" xmlns:r="http://schemas.openxmlformats.org/officeDocument/2006/relationships" xmlns:p="http://schemas.openxmlformats.org/presentationml/2006/main" showMasterSp="0" showMasterPhAnim="0">
+  <p:cSld>
+    <p:spTree>
+      <p:nvGrpSpPr>
         <p:cNvPr id="1" name="Shape 73"/>
         <p:cNvGrpSpPr/>
         <p:nvPr/>
@@ -2215,7 +2434,7 @@
         </p:nvSpPr>
         <p:spPr>
           <a:xfrm>
-            <a:off x="381300" y="685800"/>
+            <a:off x="381000" y="685800"/>
             <a:ext cx="6096000" cy="3429000"/>
           </a:xfrm>
           <a:custGeom>
@@ -2290,7 +2509,7 @@
 </p:notes>
 </file>
 
-<file path=ppt/notesSlides/notesSlide4.xml><?xml version="1.0" encoding="utf-8"?>
+<file path=ppt/notesSlides/notesSlide5.xml><?xml version="1.0" encoding="utf-8"?>
 <p:notes xmlns:a="http://schemas.openxmlformats.org/drawingml/2006/main" xmlns:r="http://schemas.openxmlformats.org/officeDocument/2006/relationships" xmlns:p="http://schemas.openxmlformats.org/presentationml/2006/main" showMasterSp="0" showMasterPhAnim="0">
   <p:cSld>
     <p:spTree>
@@ -2319,7 +2538,7 @@
         </p:nvSpPr>
         <p:spPr>
           <a:xfrm>
-            <a:off x="381300" y="685800"/>
+            <a:off x="381000" y="685800"/>
             <a:ext cx="6096000" cy="3429000"/>
           </a:xfrm>
           <a:custGeom>
@@ -2394,7 +2613,7 @@
 </p:notes>
 </file>
 
-<file path=ppt/notesSlides/notesSlide5.xml><?xml version="1.0" encoding="utf-8"?>
+<file path=ppt/notesSlides/notesSlide6.xml><?xml version="1.0" encoding="utf-8"?>
 <p:notes xmlns:a="http://schemas.openxmlformats.org/drawingml/2006/main" xmlns:r="http://schemas.openxmlformats.org/officeDocument/2006/relationships" xmlns:p="http://schemas.openxmlformats.org/presentationml/2006/main" showMasterSp="0" showMasterPhAnim="0">
   <p:cSld>
     <p:spTree>
@@ -2498,7 +2717,7 @@
 </p:notes>
 </file>
 
-<file path=ppt/notesSlides/notesSlide6.xml><?xml version="1.0" encoding="utf-8"?>
+<file path=ppt/notesSlides/notesSlide7.xml><?xml version="1.0" encoding="utf-8"?>
 <p:notes xmlns:a="http://schemas.openxmlformats.org/drawingml/2006/main" xmlns:r="http://schemas.openxmlformats.org/officeDocument/2006/relationships" xmlns:p="http://schemas.openxmlformats.org/presentationml/2006/main" showMasterSp="0" showMasterPhAnim="0">
   <p:cSld>
     <p:spTree>
@@ -2602,7 +2821,7 @@
 </p:notes>
 </file>
 
-<file path=ppt/notesSlides/notesSlide7.xml><?xml version="1.0" encoding="utf-8"?>
+<file path=ppt/notesSlides/notesSlide8.xml><?xml version="1.0" encoding="utf-8"?>
 <p:notes xmlns:a="http://schemas.openxmlformats.org/drawingml/2006/main" xmlns:r="http://schemas.openxmlformats.org/officeDocument/2006/relationships" xmlns:p="http://schemas.openxmlformats.org/presentationml/2006/main" showMasterSp="0" showMasterPhAnim="0">
   <p:cSld>
     <p:spTree>
@@ -2706,7 +2925,7 @@
 </p:notes>
 </file>
 
-<file path=ppt/notesSlides/notesSlide8.xml><?xml version="1.0" encoding="utf-8"?>
+<file path=ppt/notesSlides/notesSlide9.xml><?xml version="1.0" encoding="utf-8"?>
 <p:notes xmlns:a="http://schemas.openxmlformats.org/drawingml/2006/main" xmlns:r="http://schemas.openxmlformats.org/officeDocument/2006/relationships" xmlns:p="http://schemas.openxmlformats.org/presentationml/2006/main" showMasterSp="0" showMasterPhAnim="0">
   <p:cSld>
     <p:spTree>
@@ -2767,110 +2986,6 @@
       <p:sp>
         <p:nvSpPr>
           <p:cNvPr id="135" name="Google Shape;135;g155d01b7735_0_63:notes"/>
-          <p:cNvSpPr txBox="1">
-            <a:spLocks noGrp="1"/>
-          </p:cNvSpPr>
-          <p:nvPr>
-            <p:ph type="body" idx="1"/>
-          </p:nvPr>
-        </p:nvSpPr>
-        <p:spPr>
-          <a:xfrm>
-            <a:off x="685800" y="4343400"/>
-            <a:ext cx="5486400" cy="4114800"/>
-          </a:xfrm>
-          <a:prstGeom prst="rect">
-            <a:avLst/>
-          </a:prstGeom>
-        </p:spPr>
-        <p:txBody>
-          <a:bodyPr spcFirstLastPara="1" wrap="square" lIns="91425" tIns="91425" rIns="91425" bIns="91425" anchor="t" anchorCtr="0">
-            <a:noAutofit/>
-          </a:bodyPr>
-          <a:lstStyle/>
-          <a:p>
-            <a:pPr marL="0" lvl="0" indent="0" algn="l" rtl="0">
-              <a:spcBef>
-                <a:spcPts val="0"/>
-              </a:spcBef>
-              <a:spcAft>
-                <a:spcPts val="0"/>
-              </a:spcAft>
-              <a:buNone/>
-            </a:pPr>
-            <a:endParaRPr/>
-          </a:p>
-        </p:txBody>
-      </p:sp>
-    </p:spTree>
-  </p:cSld>
-  <p:clrMapOvr>
-    <a:masterClrMapping/>
-  </p:clrMapOvr>
-</p:notes>
-</file>
-
-<file path=ppt/notesSlides/notesSlide9.xml><?xml version="1.0" encoding="utf-8"?>
-<p:notes xmlns:a="http://schemas.openxmlformats.org/drawingml/2006/main" xmlns:r="http://schemas.openxmlformats.org/officeDocument/2006/relationships" xmlns:p="http://schemas.openxmlformats.org/presentationml/2006/main" showMasterSp="0" showMasterPhAnim="0">
-  <p:cSld>
-    <p:spTree>
-      <p:nvGrpSpPr>
-        <p:cNvPr id="1" name="Shape 142"/>
-        <p:cNvGrpSpPr/>
-        <p:nvPr/>
-      </p:nvGrpSpPr>
-      <p:grpSpPr>
-        <a:xfrm>
-          <a:off x="0" y="0"/>
-          <a:ext cx="0" cy="0"/>
-          <a:chOff x="0" y="0"/>
-          <a:chExt cx="0" cy="0"/>
-        </a:xfrm>
-      </p:grpSpPr>
-      <p:sp>
-        <p:nvSpPr>
-          <p:cNvPr id="143" name="Google Shape;143;g155d01b7735_0_71:notes"/>
-          <p:cNvSpPr>
-            <a:spLocks noGrp="1" noRot="1" noChangeAspect="1"/>
-          </p:cNvSpPr>
-          <p:nvPr>
-            <p:ph type="sldImg" idx="2"/>
-          </p:nvPr>
-        </p:nvSpPr>
-        <p:spPr>
-          <a:xfrm>
-            <a:off x="381300" y="685800"/>
-            <a:ext cx="6096000" cy="3429000"/>
-          </a:xfrm>
-          <a:custGeom>
-            <a:avLst/>
-            <a:gdLst/>
-            <a:ahLst/>
-            <a:cxnLst/>
-            <a:rect l="l" t="t" r="r" b="b"/>
-            <a:pathLst>
-              <a:path w="120000" h="120000" extrusionOk="0">
-                <a:moveTo>
-                  <a:pt x="0" y="0"/>
-                </a:moveTo>
-                <a:lnTo>
-                  <a:pt x="120000" y="0"/>
-                </a:lnTo>
-                <a:lnTo>
-                  <a:pt x="120000" y="120000"/>
-                </a:lnTo>
-                <a:lnTo>
-                  <a:pt x="0" y="120000"/>
-                </a:lnTo>
-                <a:close/>
-              </a:path>
-            </a:pathLst>
-          </a:custGeom>
-        </p:spPr>
-      </p:sp>
-      <p:sp>
-        <p:nvSpPr>
-          <p:cNvPr id="144" name="Google Shape;144;g155d01b7735_0_71:notes"/>
           <p:cNvSpPr txBox="1">
             <a:spLocks noGrp="1"/>
           </p:cNvSpPr>
@@ -6976,7 +7091,7 @@
         <p:push/>
       </p:transition>
     </mc:Choice>
-    <mc:Fallback xmlns:ahyp="http://schemas.microsoft.com/office/drawing/2018/hyperlinkcolor" xmlns:p15="http://schemas.microsoft.com/office/powerpoint/2012/main" xmlns:com="http://schemas.openxmlformats.org/drawingml/2006/compatibility" xmlns:pvml="urn:schemas-microsoft-com:office:powerpoint" xmlns:v="urn:schemas-microsoft-com:vml" xmlns:o="urn:schemas-microsoft-com:office:office" xmlns:dgm="http://schemas.openxmlformats.org/drawingml/2006/diagram" xmlns:c="http://schemas.openxmlformats.org/drawingml/2006/chart" xmlns:mv="urn:schemas-microsoft-com:mac:vml" xmlns="">
+    <mc:Fallback xmlns="" xmlns:mv="urn:schemas-microsoft-com:mac:vml" xmlns:c="http://schemas.openxmlformats.org/drawingml/2006/chart" xmlns:dgm="http://schemas.openxmlformats.org/drawingml/2006/diagram" xmlns:o="urn:schemas-microsoft-com:office:office" xmlns:v="urn:schemas-microsoft-com:vml" xmlns:pvml="urn:schemas-microsoft-com:office:powerpoint" xmlns:com="http://schemas.openxmlformats.org/drawingml/2006/compatibility" xmlns:p15="http://schemas.microsoft.com/office/powerpoint/2012/main" xmlns:ahyp="http://schemas.microsoft.com/office/drawing/2018/hyperlinkcolor">
       <p:transition spd="slow">
         <p:fade/>
       </p:transition>
@@ -7779,7 +7894,7 @@
               <a:buNone/>
             </a:pPr>
             <a:r>
-              <a:rPr lang="en" sz="2600" b="1">
+              <a:rPr lang="en" sz="2600" b="1" dirty="0">
                 <a:solidFill>
                   <a:schemeClr val="accent1"/>
                 </a:solidFill>
@@ -7790,7 +7905,7 @@
               </a:rPr>
               <a:t>Bellabeat health-focused behavior analysis</a:t>
             </a:r>
-            <a:endParaRPr sz="2600" b="1">
+            <a:endParaRPr sz="2600" b="1" dirty="0">
               <a:solidFill>
                 <a:schemeClr val="accent1"/>
               </a:solidFill>
@@ -7999,6 +8114,348 @@
 </file>
 
 <file path=ppt/slides/slide10.xml><?xml version="1.0" encoding="utf-8"?>
+<p:sld xmlns:a="http://schemas.openxmlformats.org/drawingml/2006/main" xmlns:r="http://schemas.openxmlformats.org/officeDocument/2006/relationships" xmlns:p="http://schemas.openxmlformats.org/presentationml/2006/main">
+  <p:cSld>
+    <p:spTree>
+      <p:nvGrpSpPr>
+        <p:cNvPr id="1" name="Shape 145"/>
+        <p:cNvGrpSpPr/>
+        <p:nvPr/>
+      </p:nvGrpSpPr>
+      <p:grpSpPr>
+        <a:xfrm>
+          <a:off x="0" y="0"/>
+          <a:ext cx="0" cy="0"/>
+          <a:chOff x="0" y="0"/>
+          <a:chExt cx="0" cy="0"/>
+        </a:xfrm>
+      </p:grpSpPr>
+      <p:sp>
+        <p:nvSpPr>
+          <p:cNvPr id="146" name="Google Shape;146;p21"/>
+          <p:cNvSpPr/>
+          <p:nvPr/>
+        </p:nvSpPr>
+        <p:spPr>
+          <a:xfrm rot="-5400000">
+            <a:off x="-2567125" y="2549900"/>
+            <a:ext cx="5152800" cy="52800"/>
+          </a:xfrm>
+          <a:prstGeom prst="rect">
+            <a:avLst/>
+          </a:prstGeom>
+          <a:solidFill>
+            <a:schemeClr val="accent1"/>
+          </a:solidFill>
+          <a:ln>
+            <a:noFill/>
+          </a:ln>
+        </p:spPr>
+        <p:txBody>
+          <a:bodyPr spcFirstLastPara="1" wrap="square" lIns="91425" tIns="91425" rIns="91425" bIns="91425" anchor="ctr" anchorCtr="0">
+            <a:noAutofit/>
+          </a:bodyPr>
+          <a:lstStyle/>
+          <a:p>
+            <a:pPr marL="0" lvl="0" indent="0" algn="l" rtl="0">
+              <a:spcBef>
+                <a:spcPts val="0"/>
+              </a:spcBef>
+              <a:spcAft>
+                <a:spcPts val="0"/>
+              </a:spcAft>
+              <a:buNone/>
+            </a:pPr>
+            <a:endParaRPr/>
+          </a:p>
+        </p:txBody>
+      </p:sp>
+      <p:sp>
+        <p:nvSpPr>
+          <p:cNvPr id="147" name="Google Shape;147;p21"/>
+          <p:cNvSpPr txBox="1"/>
+          <p:nvPr/>
+        </p:nvSpPr>
+        <p:spPr>
+          <a:xfrm>
+            <a:off x="235225" y="983925"/>
+            <a:ext cx="8807700" cy="461700"/>
+          </a:xfrm>
+          <a:prstGeom prst="rect">
+            <a:avLst/>
+          </a:prstGeom>
+          <a:noFill/>
+          <a:ln>
+            <a:noFill/>
+          </a:ln>
+        </p:spPr>
+        <p:txBody>
+          <a:bodyPr spcFirstLastPara="1" wrap="square" lIns="91425" tIns="91425" rIns="91425" bIns="91425" anchor="t" anchorCtr="0">
+            <a:spAutoFit/>
+          </a:bodyPr>
+          <a:lstStyle/>
+          <a:p>
+            <a:pPr marL="0" lvl="0" indent="0" algn="l" rtl="0">
+              <a:spcBef>
+                <a:spcPts val="0"/>
+              </a:spcBef>
+              <a:spcAft>
+                <a:spcPts val="0"/>
+              </a:spcAft>
+              <a:buNone/>
+            </a:pPr>
+            <a:r>
+              <a:rPr lang="en" sz="1800" b="1">
+                <a:solidFill>
+                  <a:schemeClr val="accent1"/>
+                </a:solidFill>
+                <a:latin typeface="Open Sans"/>
+                <a:ea typeface="Open Sans"/>
+                <a:cs typeface="Open Sans"/>
+                <a:sym typeface="Open Sans"/>
+              </a:rPr>
+              <a:t>Hourly steps and hourly calories</a:t>
+            </a:r>
+            <a:endParaRPr sz="1800" b="1">
+              <a:solidFill>
+                <a:schemeClr val="accent1"/>
+              </a:solidFill>
+              <a:latin typeface="Open Sans"/>
+              <a:ea typeface="Open Sans"/>
+              <a:cs typeface="Open Sans"/>
+              <a:sym typeface="Open Sans"/>
+            </a:endParaRPr>
+          </a:p>
+        </p:txBody>
+      </p:sp>
+      <p:sp>
+        <p:nvSpPr>
+          <p:cNvPr id="148" name="Google Shape;148;p21"/>
+          <p:cNvSpPr txBox="1"/>
+          <p:nvPr/>
+        </p:nvSpPr>
+        <p:spPr>
+          <a:xfrm>
+            <a:off x="235225" y="2299250"/>
+            <a:ext cx="4117200" cy="554100"/>
+          </a:xfrm>
+          <a:prstGeom prst="rect">
+            <a:avLst/>
+          </a:prstGeom>
+          <a:noFill/>
+          <a:ln>
+            <a:noFill/>
+          </a:ln>
+        </p:spPr>
+        <p:txBody>
+          <a:bodyPr spcFirstLastPara="1" wrap="square" lIns="91425" tIns="91425" rIns="91425" bIns="91425" anchor="t" anchorCtr="0">
+            <a:spAutoFit/>
+          </a:bodyPr>
+          <a:lstStyle/>
+          <a:p>
+            <a:pPr marL="342900" lvl="0" indent="-304800" algn="just" rtl="0">
+              <a:lnSpc>
+                <a:spcPct val="100000"/>
+              </a:lnSpc>
+              <a:spcBef>
+                <a:spcPts val="0"/>
+              </a:spcBef>
+              <a:spcAft>
+                <a:spcPts val="0"/>
+              </a:spcAft>
+              <a:buClr>
+                <a:schemeClr val="dk1"/>
+              </a:buClr>
+              <a:buSzPts val="1200"/>
+              <a:buFont typeface="Open Sans"/>
+              <a:buChar char="●"/>
+            </a:pPr>
+            <a:r>
+              <a:rPr lang="en" sz="1200">
+                <a:solidFill>
+                  <a:schemeClr val="dk1"/>
+                </a:solidFill>
+                <a:latin typeface="Open Sans"/>
+                <a:ea typeface="Open Sans"/>
+                <a:cs typeface="Open Sans"/>
+                <a:sym typeface="Open Sans"/>
+              </a:rPr>
+              <a:t>When considered on an hourly basis, steps taken and calories burnt are almost perfectly correlated.</a:t>
+            </a:r>
+            <a:endParaRPr sz="1200">
+              <a:solidFill>
+                <a:schemeClr val="dk1"/>
+              </a:solidFill>
+              <a:latin typeface="Open Sans"/>
+              <a:ea typeface="Open Sans"/>
+              <a:cs typeface="Open Sans"/>
+              <a:sym typeface="Open Sans"/>
+            </a:endParaRPr>
+          </a:p>
+        </p:txBody>
+      </p:sp>
+      <p:pic>
+        <p:nvPicPr>
+          <p:cNvPr id="149" name="Google Shape;149;p21"/>
+          <p:cNvPicPr preferRelativeResize="0"/>
+          <p:nvPr/>
+        </p:nvPicPr>
+        <p:blipFill>
+          <a:blip r:embed="rId3">
+            <a:alphaModFix/>
+          </a:blip>
+          <a:stretch>
+            <a:fillRect/>
+          </a:stretch>
+        </p:blipFill>
+        <p:spPr>
+          <a:xfrm>
+            <a:off x="4352425" y="1598025"/>
+            <a:ext cx="4639175" cy="2863034"/>
+          </a:xfrm>
+          <a:prstGeom prst="rect">
+            <a:avLst/>
+          </a:prstGeom>
+          <a:noFill/>
+          <a:ln>
+            <a:noFill/>
+          </a:ln>
+        </p:spPr>
+      </p:pic>
+      <p:sp>
+        <p:nvSpPr>
+          <p:cNvPr id="150" name="Google Shape;150;p21"/>
+          <p:cNvSpPr txBox="1"/>
+          <p:nvPr/>
+        </p:nvSpPr>
+        <p:spPr>
+          <a:xfrm>
+            <a:off x="276100" y="4745250"/>
+            <a:ext cx="7566900" cy="323100"/>
+          </a:xfrm>
+          <a:prstGeom prst="rect">
+            <a:avLst/>
+          </a:prstGeom>
+          <a:noFill/>
+          <a:ln>
+            <a:noFill/>
+          </a:ln>
+        </p:spPr>
+        <p:txBody>
+          <a:bodyPr spcFirstLastPara="1" wrap="square" lIns="91425" tIns="91425" rIns="91425" bIns="91425" anchor="t" anchorCtr="0">
+            <a:spAutoFit/>
+          </a:bodyPr>
+          <a:lstStyle/>
+          <a:p>
+            <a:pPr marL="0" lvl="0" indent="0" algn="l" rtl="0">
+              <a:spcBef>
+                <a:spcPts val="0"/>
+              </a:spcBef>
+              <a:spcAft>
+                <a:spcPts val="0"/>
+              </a:spcAft>
+              <a:buNone/>
+            </a:pPr>
+            <a:r>
+              <a:rPr lang="en" sz="900" i="1"/>
+              <a:t>*Data source: public dataset of “FitBit Fitness Tracker Data” from Mobius</a:t>
+            </a:r>
+            <a:endParaRPr sz="900" i="1"/>
+          </a:p>
+        </p:txBody>
+      </p:sp>
+    </p:spTree>
+  </p:cSld>
+  <p:clrMapOvr>
+    <a:masterClrMapping/>
+  </p:clrMapOvr>
+  <p:timing>
+    <p:tnLst>
+      <p:par>
+        <p:cTn id="1" dur="indefinite" restart="never" nodeType="tmRoot">
+          <p:childTnLst>
+            <p:seq concurrent="1" nextAc="seek">
+              <p:cTn id="2" dur="indefinite" nodeType="mainSeq">
+                <p:childTnLst>
+                  <p:par>
+                    <p:cTn id="3" fill="hold">
+                      <p:stCondLst>
+                        <p:cond delay="indefinite"/>
+                      </p:stCondLst>
+                      <p:childTnLst>
+                        <p:par>
+                          <p:cTn id="4" fill="hold">
+                            <p:stCondLst>
+                              <p:cond delay="0"/>
+                            </p:stCondLst>
+                            <p:childTnLst>
+                              <p:par>
+                                <p:cTn id="5" presetID="10" presetClass="entr" presetSubtype="0" fill="hold" nodeType="clickEffect">
+                                  <p:stCondLst>
+                                    <p:cond delay="0"/>
+                                  </p:stCondLst>
+                                  <p:childTnLst>
+                                    <p:set>
+                                      <p:cBhvr>
+                                        <p:cTn id="6" dur="1" fill="hold">
+                                          <p:stCondLst>
+                                            <p:cond delay="0"/>
+                                          </p:stCondLst>
+                                        </p:cTn>
+                                        <p:tgtEl>
+                                          <p:spTgt spid="148"/>
+                                        </p:tgtEl>
+                                        <p:attrNameLst>
+                                          <p:attrName>style.visibility</p:attrName>
+                                        </p:attrNameLst>
+                                      </p:cBhvr>
+                                      <p:to>
+                                        <p:strVal val="visible"/>
+                                      </p:to>
+                                    </p:set>
+                                    <p:animEffect transition="in" filter="fade">
+                                      <p:cBhvr>
+                                        <p:cTn id="7" dur="1000"/>
+                                        <p:tgtEl>
+                                          <p:spTgt spid="148"/>
+                                        </p:tgtEl>
+                                      </p:cBhvr>
+                                    </p:animEffect>
+                                  </p:childTnLst>
+                                </p:cTn>
+                              </p:par>
+                            </p:childTnLst>
+                          </p:cTn>
+                        </p:par>
+                      </p:childTnLst>
+                    </p:cTn>
+                  </p:par>
+                </p:childTnLst>
+              </p:cTn>
+              <p:prevCondLst>
+                <p:cond evt="onPrev" delay="0">
+                  <p:tgtEl>
+                    <p:sldTgt/>
+                  </p:tgtEl>
+                </p:cond>
+              </p:prevCondLst>
+              <p:nextCondLst>
+                <p:cond evt="onNext" delay="0">
+                  <p:tgtEl>
+                    <p:sldTgt/>
+                  </p:tgtEl>
+                </p:cond>
+              </p:nextCondLst>
+            </p:seq>
+          </p:childTnLst>
+        </p:cTn>
+      </p:par>
+    </p:tnLst>
+  </p:timing>
+</p:sld>
+</file>
+
+<file path=ppt/slides/slide11.xml><?xml version="1.0" encoding="utf-8"?>
 <p:sld xmlns:a="http://schemas.openxmlformats.org/drawingml/2006/main" xmlns:r="http://schemas.openxmlformats.org/officeDocument/2006/relationships" xmlns:p="http://schemas.openxmlformats.org/presentationml/2006/main">
   <p:cSld>
     <p:spTree>
@@ -8490,7 +8947,7 @@
 </p:sld>
 </file>
 
-<file path=ppt/slides/slide11.xml><?xml version="1.0" encoding="utf-8"?>
+<file path=ppt/slides/slide12.xml><?xml version="1.0" encoding="utf-8"?>
 <p:sld xmlns:a="http://schemas.openxmlformats.org/drawingml/2006/main" xmlns:r="http://schemas.openxmlformats.org/officeDocument/2006/relationships" xmlns:p="http://schemas.openxmlformats.org/presentationml/2006/main">
   <p:cSld>
     <p:spTree>
@@ -8872,7 +9329,7 @@
 </p:sld>
 </file>
 
-<file path=ppt/slides/slide12.xml><?xml version="1.0" encoding="utf-8"?>
+<file path=ppt/slides/slide13.xml><?xml version="1.0" encoding="utf-8"?>
 <p:sld xmlns:a="http://schemas.openxmlformats.org/drawingml/2006/main" xmlns:r="http://schemas.openxmlformats.org/officeDocument/2006/relationships" xmlns:p="http://schemas.openxmlformats.org/presentationml/2006/main">
   <p:cSld>
     <p:spTree>
@@ -9214,7 +9671,7 @@
 </p:sld>
 </file>
 
-<file path=ppt/slides/slide13.xml><?xml version="1.0" encoding="utf-8"?>
+<file path=ppt/slides/slide14.xml><?xml version="1.0" encoding="utf-8"?>
 <p:sld xmlns:a="http://schemas.openxmlformats.org/drawingml/2006/main" xmlns:r="http://schemas.openxmlformats.org/officeDocument/2006/relationships" xmlns:p="http://schemas.openxmlformats.org/presentationml/2006/main">
   <p:cSld>
     <p:spTree>
@@ -9630,7 +10087,7 @@
 </p:sld>
 </file>
 
-<file path=ppt/slides/slide14.xml><?xml version="1.0" encoding="utf-8"?>
+<file path=ppt/slides/slide15.xml><?xml version="1.0" encoding="utf-8"?>
 <p:sld xmlns:a="http://schemas.openxmlformats.org/drawingml/2006/main" xmlns:r="http://schemas.openxmlformats.org/officeDocument/2006/relationships" xmlns:p="http://schemas.openxmlformats.org/presentationml/2006/main">
   <p:cSld>
     <p:spTree>
@@ -10064,7 +10521,7 @@
 </p:sld>
 </file>
 
-<file path=ppt/slides/slide15.xml><?xml version="1.0" encoding="utf-8"?>
+<file path=ppt/slides/slide16.xml><?xml version="1.0" encoding="utf-8"?>
 <p:sld xmlns:a="http://schemas.openxmlformats.org/drawingml/2006/main" xmlns:r="http://schemas.openxmlformats.org/officeDocument/2006/relationships" xmlns:p="http://schemas.openxmlformats.org/presentationml/2006/main">
   <p:cSld>
     <p:spTree>
@@ -10274,14 +10731,14 @@
               <a:buChar char="●"/>
             </a:pPr>
             <a:r>
-              <a:rPr lang="en" sz="1200">
+              <a:rPr lang="en" sz="1200" dirty="0">
                 <a:solidFill>
                   <a:schemeClr val="dk1"/>
                 </a:solidFill>
               </a:rPr>
               <a:t>Low-use users have higher calories burnt while getting less sleep time compared to average sleep time of all segments.</a:t>
             </a:r>
-            <a:endParaRPr sz="1200">
+            <a:endParaRPr sz="1200" dirty="0">
               <a:solidFill>
                 <a:schemeClr val="dk1"/>
               </a:solidFill>
@@ -10503,7 +10960,7 @@
 </p:sld>
 </file>
 
-<file path=ppt/slides/slide16.xml><?xml version="1.0" encoding="utf-8"?>
+<file path=ppt/slides/slide17.xml><?xml version="1.0" encoding="utf-8"?>
 <p:sld xmlns:a="http://schemas.openxmlformats.org/drawingml/2006/main" xmlns:r="http://schemas.openxmlformats.org/officeDocument/2006/relationships" xmlns:p="http://schemas.openxmlformats.org/presentationml/2006/main">
   <p:cSld>
     <p:spTree>
@@ -10942,7 +11399,7 @@
 </p:sld>
 </file>
 
-<file path=ppt/slides/slide17.xml><?xml version="1.0" encoding="utf-8"?>
+<file path=ppt/slides/slide18.xml><?xml version="1.0" encoding="utf-8"?>
 <p:sld xmlns:a="http://schemas.openxmlformats.org/drawingml/2006/main" xmlns:r="http://schemas.openxmlformats.org/officeDocument/2006/relationships" xmlns:p="http://schemas.openxmlformats.org/presentationml/2006/main">
   <p:cSld>
     <p:spTree>
@@ -11472,7 +11929,7 @@
 </p:sld>
 </file>
 
-<file path=ppt/slides/slide18.xml><?xml version="1.0" encoding="utf-8"?>
+<file path=ppt/slides/slide19.xml><?xml version="1.0" encoding="utf-8"?>
 <p:sld xmlns:a="http://schemas.openxmlformats.org/drawingml/2006/main" xmlns:r="http://schemas.openxmlformats.org/officeDocument/2006/relationships" xmlns:p="http://schemas.openxmlformats.org/presentationml/2006/main">
   <p:cSld>
     <p:spTree>
@@ -12590,7 +13047,7 @@
                 <a:cs typeface="Open Sans"/>
                 <a:sym typeface="Open Sans"/>
               </a:rPr>
-              <a:t>Objective:</a:t>
+              <a:t>Objectives:</a:t>
             </a:r>
             <a:r>
               <a:rPr lang="en" sz="1200" dirty="0">
@@ -13104,7 +13561,640 @@
 </p:sld>
 </file>
 
-<file path=ppt/slides/slide19.xml><?xml version="1.0" encoding="utf-8"?>
+<file path=ppt/slides/slide2.xml><?xml version="1.0" encoding="utf-8"?>
+<p:sld xmlns:a="http://schemas.openxmlformats.org/drawingml/2006/main" xmlns:r="http://schemas.openxmlformats.org/officeDocument/2006/relationships" xmlns:p="http://schemas.openxmlformats.org/presentationml/2006/main">
+  <p:cSld>
+    <p:spTree>
+      <p:nvGrpSpPr>
+        <p:cNvPr id="1" name="Shape 62"/>
+        <p:cNvGrpSpPr/>
+        <p:nvPr/>
+      </p:nvGrpSpPr>
+      <p:grpSpPr>
+        <a:xfrm>
+          <a:off x="0" y="0"/>
+          <a:ext cx="0" cy="0"/>
+          <a:chOff x="0" y="0"/>
+          <a:chExt cx="0" cy="0"/>
+        </a:xfrm>
+      </p:grpSpPr>
+      <p:sp>
+        <p:nvSpPr>
+          <p:cNvPr id="63" name="Google Shape;63;p14"/>
+          <p:cNvSpPr txBox="1"/>
+          <p:nvPr/>
+        </p:nvSpPr>
+        <p:spPr>
+          <a:xfrm>
+            <a:off x="1391075" y="2012741"/>
+            <a:ext cx="5913000" cy="369302"/>
+          </a:xfrm>
+          <a:prstGeom prst="rect">
+            <a:avLst/>
+          </a:prstGeom>
+          <a:noFill/>
+          <a:ln>
+            <a:noFill/>
+          </a:ln>
+        </p:spPr>
+        <p:txBody>
+          <a:bodyPr spcFirstLastPara="1" wrap="square" lIns="91425" tIns="91425" rIns="91425" bIns="91425" anchor="t" anchorCtr="0">
+            <a:spAutoFit/>
+          </a:bodyPr>
+          <a:lstStyle/>
+          <a:p>
+            <a:pPr marL="0" lvl="0" indent="0" algn="l" rtl="0">
+              <a:spcBef>
+                <a:spcPts val="0"/>
+              </a:spcBef>
+              <a:spcAft>
+                <a:spcPts val="0"/>
+              </a:spcAft>
+              <a:buNone/>
+            </a:pPr>
+            <a:r>
+              <a:rPr lang="en" sz="1200" dirty="0">
+                <a:latin typeface="Open Sans"/>
+                <a:ea typeface="Open Sans"/>
+                <a:cs typeface="Open Sans"/>
+                <a:sym typeface="Open Sans"/>
+              </a:rPr>
+              <a:t>Executive summary</a:t>
+            </a:r>
+          </a:p>
+        </p:txBody>
+      </p:sp>
+      <p:sp>
+        <p:nvSpPr>
+          <p:cNvPr id="64" name="Google Shape;64;p14"/>
+          <p:cNvSpPr txBox="1"/>
+          <p:nvPr/>
+        </p:nvSpPr>
+        <p:spPr>
+          <a:xfrm>
+            <a:off x="907850" y="1562894"/>
+            <a:ext cx="7399800" cy="492412"/>
+          </a:xfrm>
+          <a:prstGeom prst="rect">
+            <a:avLst/>
+          </a:prstGeom>
+          <a:noFill/>
+          <a:ln>
+            <a:noFill/>
+          </a:ln>
+        </p:spPr>
+        <p:txBody>
+          <a:bodyPr spcFirstLastPara="1" wrap="square" lIns="91425" tIns="91425" rIns="91425" bIns="91425" anchor="t" anchorCtr="0">
+            <a:spAutoFit/>
+          </a:bodyPr>
+          <a:lstStyle/>
+          <a:p>
+            <a:pPr marL="0" lvl="0" indent="0" algn="l" rtl="0">
+              <a:spcBef>
+                <a:spcPts val="0"/>
+              </a:spcBef>
+              <a:spcAft>
+                <a:spcPts val="0"/>
+              </a:spcAft>
+              <a:buNone/>
+            </a:pPr>
+            <a:r>
+              <a:rPr lang="en-US" sz="2000" b="1" dirty="0" err="1">
+                <a:solidFill>
+                  <a:schemeClr val="accent1"/>
+                </a:solidFill>
+                <a:latin typeface="Open Sans"/>
+                <a:ea typeface="Open Sans"/>
+                <a:cs typeface="Open Sans"/>
+                <a:sym typeface="Open Sans"/>
+              </a:rPr>
+              <a:t>Bellabeat</a:t>
+            </a:r>
+            <a:r>
+              <a:rPr lang="en-US" sz="2000" b="1" dirty="0">
+                <a:solidFill>
+                  <a:schemeClr val="accent1"/>
+                </a:solidFill>
+                <a:latin typeface="Open Sans"/>
+                <a:ea typeface="Open Sans"/>
+                <a:cs typeface="Open Sans"/>
+                <a:sym typeface="Open Sans"/>
+              </a:rPr>
+              <a:t> health-focused behavior analysis</a:t>
+            </a:r>
+          </a:p>
+        </p:txBody>
+      </p:sp>
+      <p:sp>
+        <p:nvSpPr>
+          <p:cNvPr id="65" name="Google Shape;65;p14"/>
+          <p:cNvSpPr/>
+          <p:nvPr/>
+        </p:nvSpPr>
+        <p:spPr>
+          <a:xfrm rot="-5400000">
+            <a:off x="-2567125" y="2549900"/>
+            <a:ext cx="5152800" cy="52800"/>
+          </a:xfrm>
+          <a:prstGeom prst="rect">
+            <a:avLst/>
+          </a:prstGeom>
+          <a:solidFill>
+            <a:schemeClr val="accent1"/>
+          </a:solidFill>
+          <a:ln>
+            <a:noFill/>
+          </a:ln>
+        </p:spPr>
+        <p:txBody>
+          <a:bodyPr spcFirstLastPara="1" wrap="square" lIns="91425" tIns="91425" rIns="91425" bIns="91425" anchor="ctr" anchorCtr="0">
+            <a:noAutofit/>
+          </a:bodyPr>
+          <a:lstStyle/>
+          <a:p>
+            <a:pPr marL="0" lvl="0" indent="0" algn="l" rtl="0">
+              <a:spcBef>
+                <a:spcPts val="0"/>
+              </a:spcBef>
+              <a:spcAft>
+                <a:spcPts val="0"/>
+              </a:spcAft>
+              <a:buNone/>
+            </a:pPr>
+            <a:endParaRPr/>
+          </a:p>
+        </p:txBody>
+      </p:sp>
+      <p:sp>
+        <p:nvSpPr>
+          <p:cNvPr id="66" name="Google Shape;66;p14"/>
+          <p:cNvSpPr/>
+          <p:nvPr/>
+        </p:nvSpPr>
+        <p:spPr>
+          <a:xfrm>
+            <a:off x="1019325" y="2138690"/>
+            <a:ext cx="285300" cy="112500"/>
+          </a:xfrm>
+          <a:prstGeom prst="rightArrow">
+            <a:avLst>
+              <a:gd name="adj1" fmla="val 50000"/>
+              <a:gd name="adj2" fmla="val 50000"/>
+            </a:avLst>
+          </a:prstGeom>
+          <a:solidFill>
+            <a:schemeClr val="dk1"/>
+          </a:solidFill>
+          <a:ln w="9525" cap="flat" cmpd="sng">
+            <a:solidFill>
+              <a:schemeClr val="dk2"/>
+            </a:solidFill>
+            <a:prstDash val="solid"/>
+            <a:round/>
+            <a:headEnd type="none" w="sm" len="sm"/>
+            <a:tailEnd type="none" w="sm" len="sm"/>
+          </a:ln>
+        </p:spPr>
+        <p:txBody>
+          <a:bodyPr spcFirstLastPara="1" wrap="square" lIns="91425" tIns="91425" rIns="91425" bIns="91425" anchor="ctr" anchorCtr="0">
+            <a:noAutofit/>
+          </a:bodyPr>
+          <a:lstStyle/>
+          <a:p>
+            <a:pPr marL="0" lvl="0" indent="0" algn="l" rtl="0">
+              <a:spcBef>
+                <a:spcPts val="0"/>
+              </a:spcBef>
+              <a:spcAft>
+                <a:spcPts val="0"/>
+              </a:spcAft>
+              <a:buNone/>
+            </a:pPr>
+            <a:endParaRPr sz="1600"/>
+          </a:p>
+        </p:txBody>
+      </p:sp>
+      <p:sp>
+        <p:nvSpPr>
+          <p:cNvPr id="67" name="Google Shape;67;p14"/>
+          <p:cNvSpPr txBox="1"/>
+          <p:nvPr/>
+        </p:nvSpPr>
+        <p:spPr>
+          <a:xfrm>
+            <a:off x="1391075" y="2582053"/>
+            <a:ext cx="5913000" cy="369300"/>
+          </a:xfrm>
+          <a:prstGeom prst="rect">
+            <a:avLst/>
+          </a:prstGeom>
+          <a:noFill/>
+          <a:ln>
+            <a:noFill/>
+          </a:ln>
+        </p:spPr>
+        <p:txBody>
+          <a:bodyPr spcFirstLastPara="1" wrap="square" lIns="91425" tIns="91425" rIns="91425" bIns="91425" anchor="t" anchorCtr="0">
+            <a:spAutoFit/>
+          </a:bodyPr>
+          <a:lstStyle/>
+          <a:p>
+            <a:pPr marL="0" lvl="0" indent="0" algn="l" rtl="0">
+              <a:spcBef>
+                <a:spcPts val="0"/>
+              </a:spcBef>
+              <a:spcAft>
+                <a:spcPts val="0"/>
+              </a:spcAft>
+              <a:buNone/>
+            </a:pPr>
+            <a:r>
+              <a:rPr lang="en" sz="1200" dirty="0">
+                <a:latin typeface="Open Sans"/>
+                <a:ea typeface="Open Sans"/>
+                <a:cs typeface="Open Sans"/>
+                <a:sym typeface="Open Sans"/>
+              </a:rPr>
+              <a:t>The story about bike-share service usage behavior</a:t>
+            </a:r>
+            <a:endParaRPr sz="1200" dirty="0">
+              <a:latin typeface="Open Sans"/>
+              <a:ea typeface="Open Sans"/>
+              <a:cs typeface="Open Sans"/>
+              <a:sym typeface="Open Sans"/>
+            </a:endParaRPr>
+          </a:p>
+        </p:txBody>
+      </p:sp>
+      <p:sp>
+        <p:nvSpPr>
+          <p:cNvPr id="68" name="Google Shape;68;p14"/>
+          <p:cNvSpPr/>
+          <p:nvPr/>
+        </p:nvSpPr>
+        <p:spPr>
+          <a:xfrm>
+            <a:off x="1019325" y="2708000"/>
+            <a:ext cx="285300" cy="112500"/>
+          </a:xfrm>
+          <a:prstGeom prst="rightArrow">
+            <a:avLst>
+              <a:gd name="adj1" fmla="val 50000"/>
+              <a:gd name="adj2" fmla="val 50000"/>
+            </a:avLst>
+          </a:prstGeom>
+          <a:solidFill>
+            <a:schemeClr val="dk1"/>
+          </a:solidFill>
+          <a:ln w="9525" cap="flat" cmpd="sng">
+            <a:solidFill>
+              <a:schemeClr val="dk2"/>
+            </a:solidFill>
+            <a:prstDash val="solid"/>
+            <a:round/>
+            <a:headEnd type="none" w="sm" len="sm"/>
+            <a:tailEnd type="none" w="sm" len="sm"/>
+          </a:ln>
+        </p:spPr>
+        <p:txBody>
+          <a:bodyPr spcFirstLastPara="1" wrap="square" lIns="91425" tIns="91425" rIns="91425" bIns="91425" anchor="ctr" anchorCtr="0">
+            <a:noAutofit/>
+          </a:bodyPr>
+          <a:lstStyle/>
+          <a:p>
+            <a:pPr marL="0" lvl="0" indent="0" algn="l" rtl="0">
+              <a:spcBef>
+                <a:spcPts val="0"/>
+              </a:spcBef>
+              <a:spcAft>
+                <a:spcPts val="0"/>
+              </a:spcAft>
+              <a:buNone/>
+            </a:pPr>
+            <a:endParaRPr/>
+          </a:p>
+        </p:txBody>
+      </p:sp>
+      <p:sp>
+        <p:nvSpPr>
+          <p:cNvPr id="69" name="Google Shape;69;p14"/>
+          <p:cNvSpPr txBox="1"/>
+          <p:nvPr/>
+        </p:nvSpPr>
+        <p:spPr>
+          <a:xfrm>
+            <a:off x="1391075" y="2866707"/>
+            <a:ext cx="5913000" cy="369300"/>
+          </a:xfrm>
+          <a:prstGeom prst="rect">
+            <a:avLst/>
+          </a:prstGeom>
+          <a:noFill/>
+          <a:ln>
+            <a:noFill/>
+          </a:ln>
+        </p:spPr>
+        <p:txBody>
+          <a:bodyPr spcFirstLastPara="1" wrap="square" lIns="91425" tIns="91425" rIns="91425" bIns="91425" anchor="t" anchorCtr="0">
+            <a:spAutoFit/>
+          </a:bodyPr>
+          <a:lstStyle/>
+          <a:p>
+            <a:pPr marL="0" lvl="0" indent="0" algn="l" rtl="0">
+              <a:spcBef>
+                <a:spcPts val="0"/>
+              </a:spcBef>
+              <a:spcAft>
+                <a:spcPts val="0"/>
+              </a:spcAft>
+              <a:buNone/>
+            </a:pPr>
+            <a:r>
+              <a:rPr lang="en" sz="1200" dirty="0">
+                <a:latin typeface="Open Sans"/>
+                <a:ea typeface="Open Sans"/>
+                <a:cs typeface="Open Sans"/>
+                <a:sym typeface="Open Sans"/>
+              </a:rPr>
+              <a:t>Recommendations</a:t>
+            </a:r>
+            <a:endParaRPr sz="1200" dirty="0">
+              <a:latin typeface="Open Sans"/>
+              <a:ea typeface="Open Sans"/>
+              <a:cs typeface="Open Sans"/>
+              <a:sym typeface="Open Sans"/>
+            </a:endParaRPr>
+          </a:p>
+        </p:txBody>
+      </p:sp>
+      <p:sp>
+        <p:nvSpPr>
+          <p:cNvPr id="70" name="Google Shape;70;p14"/>
+          <p:cNvSpPr/>
+          <p:nvPr/>
+        </p:nvSpPr>
+        <p:spPr>
+          <a:xfrm>
+            <a:off x="1019325" y="2992657"/>
+            <a:ext cx="285300" cy="112500"/>
+          </a:xfrm>
+          <a:prstGeom prst="rightArrow">
+            <a:avLst>
+              <a:gd name="adj1" fmla="val 50000"/>
+              <a:gd name="adj2" fmla="val 50000"/>
+            </a:avLst>
+          </a:prstGeom>
+          <a:solidFill>
+            <a:schemeClr val="dk1"/>
+          </a:solidFill>
+          <a:ln w="9525" cap="flat" cmpd="sng">
+            <a:solidFill>
+              <a:schemeClr val="dk2"/>
+            </a:solidFill>
+            <a:prstDash val="solid"/>
+            <a:round/>
+            <a:headEnd type="none" w="sm" len="sm"/>
+            <a:tailEnd type="none" w="sm" len="sm"/>
+          </a:ln>
+        </p:spPr>
+        <p:txBody>
+          <a:bodyPr spcFirstLastPara="1" wrap="square" lIns="91425" tIns="91425" rIns="91425" bIns="91425" anchor="ctr" anchorCtr="0">
+            <a:noAutofit/>
+          </a:bodyPr>
+          <a:lstStyle/>
+          <a:p>
+            <a:pPr marL="0" lvl="0" indent="0" algn="l" rtl="0">
+              <a:spcBef>
+                <a:spcPts val="0"/>
+              </a:spcBef>
+              <a:spcAft>
+                <a:spcPts val="0"/>
+              </a:spcAft>
+              <a:buNone/>
+            </a:pPr>
+            <a:endParaRPr/>
+          </a:p>
+        </p:txBody>
+      </p:sp>
+      <p:sp>
+        <p:nvSpPr>
+          <p:cNvPr id="71" name="Google Shape;71;p14"/>
+          <p:cNvSpPr txBox="1"/>
+          <p:nvPr/>
+        </p:nvSpPr>
+        <p:spPr>
+          <a:xfrm>
+            <a:off x="1391075" y="-100"/>
+            <a:ext cx="5913000" cy="400200"/>
+          </a:xfrm>
+          <a:prstGeom prst="rect">
+            <a:avLst/>
+          </a:prstGeom>
+          <a:noFill/>
+          <a:ln>
+            <a:noFill/>
+          </a:ln>
+        </p:spPr>
+        <p:txBody>
+          <a:bodyPr spcFirstLastPara="1" wrap="square" lIns="91425" tIns="91425" rIns="91425" bIns="91425" anchor="t" anchorCtr="0">
+            <a:spAutoFit/>
+          </a:bodyPr>
+          <a:lstStyle/>
+          <a:p>
+            <a:pPr marL="0" lvl="0" indent="0" algn="ctr" rtl="0">
+              <a:spcBef>
+                <a:spcPts val="0"/>
+              </a:spcBef>
+              <a:spcAft>
+                <a:spcPts val="0"/>
+              </a:spcAft>
+              <a:buNone/>
+            </a:pPr>
+            <a:r>
+              <a:rPr lang="en" b="1">
+                <a:solidFill>
+                  <a:srgbClr val="666666"/>
+                </a:solidFill>
+                <a:latin typeface="Open Sans"/>
+                <a:ea typeface="Open Sans"/>
+                <a:cs typeface="Open Sans"/>
+                <a:sym typeface="Open Sans"/>
+              </a:rPr>
+              <a:t>Table of Contents</a:t>
+            </a:r>
+            <a:endParaRPr b="1">
+              <a:solidFill>
+                <a:srgbClr val="666666"/>
+              </a:solidFill>
+              <a:latin typeface="Open Sans"/>
+              <a:ea typeface="Open Sans"/>
+              <a:cs typeface="Open Sans"/>
+              <a:sym typeface="Open Sans"/>
+            </a:endParaRPr>
+          </a:p>
+        </p:txBody>
+      </p:sp>
+      <p:sp>
+        <p:nvSpPr>
+          <p:cNvPr id="72" name="Google Shape;72;p14"/>
+          <p:cNvSpPr/>
+          <p:nvPr/>
+        </p:nvSpPr>
+        <p:spPr>
+          <a:xfrm>
+            <a:off x="3872075" y="0"/>
+            <a:ext cx="951000" cy="35700"/>
+          </a:xfrm>
+          <a:prstGeom prst="rect">
+            <a:avLst/>
+          </a:prstGeom>
+          <a:solidFill>
+            <a:schemeClr val="accent1"/>
+          </a:solidFill>
+          <a:ln>
+            <a:noFill/>
+          </a:ln>
+        </p:spPr>
+        <p:txBody>
+          <a:bodyPr spcFirstLastPara="1" wrap="square" lIns="91425" tIns="91425" rIns="91425" bIns="91425" anchor="ctr" anchorCtr="0">
+            <a:noAutofit/>
+          </a:bodyPr>
+          <a:lstStyle/>
+          <a:p>
+            <a:pPr marL="0" lvl="0" indent="0" algn="l" rtl="0">
+              <a:spcBef>
+                <a:spcPts val="0"/>
+              </a:spcBef>
+              <a:spcAft>
+                <a:spcPts val="0"/>
+              </a:spcAft>
+              <a:buNone/>
+            </a:pPr>
+            <a:endParaRPr/>
+          </a:p>
+        </p:txBody>
+      </p:sp>
+      <p:sp>
+        <p:nvSpPr>
+          <p:cNvPr id="4" name="Google Shape;63;p14">
+            <a:extLst>
+              <a:ext uri="{FF2B5EF4-FFF2-40B4-BE49-F238E27FC236}">
+                <a16:creationId xmlns:a16="http://schemas.microsoft.com/office/drawing/2014/main" id="{E2E9D685-EA4B-413C-D087-03D1E23E7202}"/>
+              </a:ext>
+            </a:extLst>
+          </p:cNvPr>
+          <p:cNvSpPr txBox="1"/>
+          <p:nvPr/>
+        </p:nvSpPr>
+        <p:spPr>
+          <a:xfrm>
+            <a:off x="1391075" y="2297397"/>
+            <a:ext cx="5913000" cy="369302"/>
+          </a:xfrm>
+          <a:prstGeom prst="rect">
+            <a:avLst/>
+          </a:prstGeom>
+          <a:noFill/>
+          <a:ln>
+            <a:noFill/>
+          </a:ln>
+        </p:spPr>
+        <p:txBody>
+          <a:bodyPr spcFirstLastPara="1" wrap="square" lIns="91425" tIns="91425" rIns="91425" bIns="91425" anchor="t" anchorCtr="0">
+            <a:spAutoFit/>
+          </a:bodyPr>
+          <a:lstStyle/>
+          <a:p>
+            <a:pPr marL="0" lvl="0" indent="0" algn="l" rtl="0">
+              <a:spcBef>
+                <a:spcPts val="0"/>
+              </a:spcBef>
+              <a:spcAft>
+                <a:spcPts val="0"/>
+              </a:spcAft>
+              <a:buNone/>
+            </a:pPr>
+            <a:r>
+              <a:rPr lang="en" sz="1200" dirty="0">
+                <a:latin typeface="Open Sans"/>
+                <a:ea typeface="Open Sans"/>
+                <a:cs typeface="Open Sans"/>
+                <a:sym typeface="Open Sans"/>
+              </a:rPr>
+              <a:t>Analytics goals</a:t>
+            </a:r>
+          </a:p>
+        </p:txBody>
+      </p:sp>
+      <p:sp>
+        <p:nvSpPr>
+          <p:cNvPr id="5" name="Google Shape;66;p14">
+            <a:extLst>
+              <a:ext uri="{FF2B5EF4-FFF2-40B4-BE49-F238E27FC236}">
+                <a16:creationId xmlns:a16="http://schemas.microsoft.com/office/drawing/2014/main" id="{91E4427E-4C5D-1DA7-EE4C-E62A86D3E866}"/>
+              </a:ext>
+            </a:extLst>
+          </p:cNvPr>
+          <p:cNvSpPr/>
+          <p:nvPr/>
+        </p:nvSpPr>
+        <p:spPr>
+          <a:xfrm>
+            <a:off x="1019325" y="2423346"/>
+            <a:ext cx="285300" cy="112500"/>
+          </a:xfrm>
+          <a:prstGeom prst="rightArrow">
+            <a:avLst>
+              <a:gd name="adj1" fmla="val 50000"/>
+              <a:gd name="adj2" fmla="val 50000"/>
+            </a:avLst>
+          </a:prstGeom>
+          <a:solidFill>
+            <a:schemeClr val="dk1"/>
+          </a:solidFill>
+          <a:ln w="9525" cap="flat" cmpd="sng">
+            <a:solidFill>
+              <a:schemeClr val="dk2"/>
+            </a:solidFill>
+            <a:prstDash val="solid"/>
+            <a:round/>
+            <a:headEnd type="none" w="sm" len="sm"/>
+            <a:tailEnd type="none" w="sm" len="sm"/>
+          </a:ln>
+        </p:spPr>
+        <p:txBody>
+          <a:bodyPr spcFirstLastPara="1" wrap="square" lIns="91425" tIns="91425" rIns="91425" bIns="91425" anchor="ctr" anchorCtr="0">
+            <a:noAutofit/>
+          </a:bodyPr>
+          <a:lstStyle/>
+          <a:p>
+            <a:pPr marL="0" lvl="0" indent="0" algn="l" rtl="0">
+              <a:spcBef>
+                <a:spcPts val="0"/>
+              </a:spcBef>
+              <a:spcAft>
+                <a:spcPts val="0"/>
+              </a:spcAft>
+              <a:buNone/>
+            </a:pPr>
+            <a:endParaRPr sz="1600"/>
+          </a:p>
+        </p:txBody>
+      </p:sp>
+    </p:spTree>
+    <p:extLst>
+      <p:ext uri="{BB962C8B-B14F-4D97-AF65-F5344CB8AC3E}">
+        <p14:creationId xmlns:p14="http://schemas.microsoft.com/office/powerpoint/2010/main" val="332957592"/>
+      </p:ext>
+    </p:extLst>
+  </p:cSld>
+  <p:clrMapOvr>
+    <a:masterClrMapping/>
+  </p:clrMapOvr>
+</p:sld>
+</file>
+
+<file path=ppt/slides/slide20.xml><?xml version="1.0" encoding="utf-8"?>
 <p:sld xmlns:a="http://schemas.openxmlformats.org/drawingml/2006/main" xmlns:r="http://schemas.openxmlformats.org/officeDocument/2006/relationships" xmlns:p="http://schemas.openxmlformats.org/presentationml/2006/main">
   <p:cSld>
     <p:spTree>
@@ -13267,531 +14357,7 @@
 </p:sld>
 </file>
 
-<file path=ppt/slides/slide2.xml><?xml version="1.0" encoding="utf-8"?>
-<p:sld xmlns:a="http://schemas.openxmlformats.org/drawingml/2006/main" xmlns:r="http://schemas.openxmlformats.org/officeDocument/2006/relationships" xmlns:p="http://schemas.openxmlformats.org/presentationml/2006/main">
-  <p:cSld>
-    <p:spTree>
-      <p:nvGrpSpPr>
-        <p:cNvPr id="1" name="Shape 62"/>
-        <p:cNvGrpSpPr/>
-        <p:nvPr/>
-      </p:nvGrpSpPr>
-      <p:grpSpPr>
-        <a:xfrm>
-          <a:off x="0" y="0"/>
-          <a:ext cx="0" cy="0"/>
-          <a:chOff x="0" y="0"/>
-          <a:chExt cx="0" cy="0"/>
-        </a:xfrm>
-      </p:grpSpPr>
-      <p:sp>
-        <p:nvSpPr>
-          <p:cNvPr id="63" name="Google Shape;63;p14"/>
-          <p:cNvSpPr txBox="1"/>
-          <p:nvPr/>
-        </p:nvSpPr>
-        <p:spPr>
-          <a:xfrm>
-            <a:off x="1391075" y="2024075"/>
-            <a:ext cx="5913000" cy="369300"/>
-          </a:xfrm>
-          <a:prstGeom prst="rect">
-            <a:avLst/>
-          </a:prstGeom>
-          <a:noFill/>
-          <a:ln>
-            <a:noFill/>
-          </a:ln>
-        </p:spPr>
-        <p:txBody>
-          <a:bodyPr spcFirstLastPara="1" wrap="square" lIns="91425" tIns="91425" rIns="91425" bIns="91425" anchor="t" anchorCtr="0">
-            <a:spAutoFit/>
-          </a:bodyPr>
-          <a:lstStyle/>
-          <a:p>
-            <a:pPr marL="0" lvl="0" indent="0" algn="l" rtl="0">
-              <a:spcBef>
-                <a:spcPts val="0"/>
-              </a:spcBef>
-              <a:spcAft>
-                <a:spcPts val="0"/>
-              </a:spcAft>
-              <a:buNone/>
-            </a:pPr>
-            <a:r>
-              <a:rPr lang="en" sz="1200">
-                <a:latin typeface="Open Sans"/>
-                <a:ea typeface="Open Sans"/>
-                <a:cs typeface="Open Sans"/>
-                <a:sym typeface="Open Sans"/>
-              </a:rPr>
-              <a:t>Objectives</a:t>
-            </a:r>
-            <a:endParaRPr sz="1200">
-              <a:latin typeface="Open Sans"/>
-              <a:ea typeface="Open Sans"/>
-              <a:cs typeface="Open Sans"/>
-              <a:sym typeface="Open Sans"/>
-            </a:endParaRPr>
-          </a:p>
-        </p:txBody>
-      </p:sp>
-      <p:sp>
-        <p:nvSpPr>
-          <p:cNvPr id="64" name="Google Shape;64;p14"/>
-          <p:cNvSpPr txBox="1"/>
-          <p:nvPr/>
-        </p:nvSpPr>
-        <p:spPr>
-          <a:xfrm>
-            <a:off x="907850" y="1500875"/>
-            <a:ext cx="7399800" cy="523200"/>
-          </a:xfrm>
-          <a:prstGeom prst="rect">
-            <a:avLst/>
-          </a:prstGeom>
-          <a:noFill/>
-          <a:ln>
-            <a:noFill/>
-          </a:ln>
-        </p:spPr>
-        <p:txBody>
-          <a:bodyPr spcFirstLastPara="1" wrap="square" lIns="91425" tIns="91425" rIns="91425" bIns="91425" anchor="t" anchorCtr="0">
-            <a:spAutoFit/>
-          </a:bodyPr>
-          <a:lstStyle/>
-          <a:p>
-            <a:pPr marL="0" lvl="0" indent="0" algn="l" rtl="0">
-              <a:spcBef>
-                <a:spcPts val="0"/>
-              </a:spcBef>
-              <a:spcAft>
-                <a:spcPts val="0"/>
-              </a:spcAft>
-              <a:buNone/>
-            </a:pPr>
-            <a:r>
-              <a:rPr lang="en" sz="2200" b="1">
-                <a:solidFill>
-                  <a:schemeClr val="accent1"/>
-                </a:solidFill>
-                <a:latin typeface="Open Sans"/>
-                <a:ea typeface="Open Sans"/>
-                <a:cs typeface="Open Sans"/>
-                <a:sym typeface="Open Sans"/>
-              </a:rPr>
-              <a:t>Cyclistic bike-share</a:t>
-            </a:r>
-            <a:endParaRPr sz="2200" b="1">
-              <a:solidFill>
-                <a:schemeClr val="accent1"/>
-              </a:solidFill>
-              <a:latin typeface="Open Sans"/>
-              <a:ea typeface="Open Sans"/>
-              <a:cs typeface="Open Sans"/>
-              <a:sym typeface="Open Sans"/>
-            </a:endParaRPr>
-          </a:p>
-        </p:txBody>
-      </p:sp>
-      <p:sp>
-        <p:nvSpPr>
-          <p:cNvPr id="65" name="Google Shape;65;p14"/>
-          <p:cNvSpPr/>
-          <p:nvPr/>
-        </p:nvSpPr>
-        <p:spPr>
-          <a:xfrm rot="-5400000">
-            <a:off x="-2567125" y="2549900"/>
-            <a:ext cx="5152800" cy="52800"/>
-          </a:xfrm>
-          <a:prstGeom prst="rect">
-            <a:avLst/>
-          </a:prstGeom>
-          <a:solidFill>
-            <a:schemeClr val="accent1"/>
-          </a:solidFill>
-          <a:ln>
-            <a:noFill/>
-          </a:ln>
-        </p:spPr>
-        <p:txBody>
-          <a:bodyPr spcFirstLastPara="1" wrap="square" lIns="91425" tIns="91425" rIns="91425" bIns="91425" anchor="ctr" anchorCtr="0">
-            <a:noAutofit/>
-          </a:bodyPr>
-          <a:lstStyle/>
-          <a:p>
-            <a:pPr marL="0" lvl="0" indent="0" algn="l" rtl="0">
-              <a:spcBef>
-                <a:spcPts val="0"/>
-              </a:spcBef>
-              <a:spcAft>
-                <a:spcPts val="0"/>
-              </a:spcAft>
-              <a:buNone/>
-            </a:pPr>
-            <a:endParaRPr/>
-          </a:p>
-        </p:txBody>
-      </p:sp>
-      <p:sp>
-        <p:nvSpPr>
-          <p:cNvPr id="66" name="Google Shape;66;p14"/>
-          <p:cNvSpPr/>
-          <p:nvPr/>
-        </p:nvSpPr>
-        <p:spPr>
-          <a:xfrm>
-            <a:off x="1019325" y="2152475"/>
-            <a:ext cx="285300" cy="112500"/>
-          </a:xfrm>
-          <a:prstGeom prst="rightArrow">
-            <a:avLst>
-              <a:gd name="adj1" fmla="val 50000"/>
-              <a:gd name="adj2" fmla="val 50000"/>
-            </a:avLst>
-          </a:prstGeom>
-          <a:solidFill>
-            <a:schemeClr val="dk1"/>
-          </a:solidFill>
-          <a:ln w="9525" cap="flat" cmpd="sng">
-            <a:solidFill>
-              <a:schemeClr val="dk2"/>
-            </a:solidFill>
-            <a:prstDash val="solid"/>
-            <a:round/>
-            <a:headEnd type="none" w="sm" len="sm"/>
-            <a:tailEnd type="none" w="sm" len="sm"/>
-          </a:ln>
-        </p:spPr>
-        <p:txBody>
-          <a:bodyPr spcFirstLastPara="1" wrap="square" lIns="91425" tIns="91425" rIns="91425" bIns="91425" anchor="ctr" anchorCtr="0">
-            <a:noAutofit/>
-          </a:bodyPr>
-          <a:lstStyle/>
-          <a:p>
-            <a:pPr marL="0" lvl="0" indent="0" algn="l" rtl="0">
-              <a:spcBef>
-                <a:spcPts val="0"/>
-              </a:spcBef>
-              <a:spcAft>
-                <a:spcPts val="0"/>
-              </a:spcAft>
-              <a:buNone/>
-            </a:pPr>
-            <a:endParaRPr sz="1600"/>
-          </a:p>
-        </p:txBody>
-      </p:sp>
-      <p:sp>
-        <p:nvSpPr>
-          <p:cNvPr id="67" name="Google Shape;67;p14"/>
-          <p:cNvSpPr txBox="1"/>
-          <p:nvPr/>
-        </p:nvSpPr>
-        <p:spPr>
-          <a:xfrm>
-            <a:off x="1391075" y="2367383"/>
-            <a:ext cx="5913000" cy="369300"/>
-          </a:xfrm>
-          <a:prstGeom prst="rect">
-            <a:avLst/>
-          </a:prstGeom>
-          <a:noFill/>
-          <a:ln>
-            <a:noFill/>
-          </a:ln>
-        </p:spPr>
-        <p:txBody>
-          <a:bodyPr spcFirstLastPara="1" wrap="square" lIns="91425" tIns="91425" rIns="91425" bIns="91425" anchor="t" anchorCtr="0">
-            <a:spAutoFit/>
-          </a:bodyPr>
-          <a:lstStyle/>
-          <a:p>
-            <a:pPr marL="0" lvl="0" indent="0" algn="l" rtl="0">
-              <a:spcBef>
-                <a:spcPts val="0"/>
-              </a:spcBef>
-              <a:spcAft>
-                <a:spcPts val="0"/>
-              </a:spcAft>
-              <a:buNone/>
-            </a:pPr>
-            <a:r>
-              <a:rPr lang="en" sz="1200">
-                <a:latin typeface="Open Sans"/>
-                <a:ea typeface="Open Sans"/>
-                <a:cs typeface="Open Sans"/>
-                <a:sym typeface="Open Sans"/>
-              </a:rPr>
-              <a:t>Health tracker device trends</a:t>
-            </a:r>
-            <a:endParaRPr sz="1200">
-              <a:latin typeface="Open Sans"/>
-              <a:ea typeface="Open Sans"/>
-              <a:cs typeface="Open Sans"/>
-              <a:sym typeface="Open Sans"/>
-            </a:endParaRPr>
-          </a:p>
-        </p:txBody>
-      </p:sp>
-      <p:sp>
-        <p:nvSpPr>
-          <p:cNvPr id="68" name="Google Shape;68;p14"/>
-          <p:cNvSpPr/>
-          <p:nvPr/>
-        </p:nvSpPr>
-        <p:spPr>
-          <a:xfrm>
-            <a:off x="1019325" y="2495783"/>
-            <a:ext cx="285300" cy="112500"/>
-          </a:xfrm>
-          <a:prstGeom prst="rightArrow">
-            <a:avLst>
-              <a:gd name="adj1" fmla="val 50000"/>
-              <a:gd name="adj2" fmla="val 50000"/>
-            </a:avLst>
-          </a:prstGeom>
-          <a:solidFill>
-            <a:schemeClr val="dk1"/>
-          </a:solidFill>
-          <a:ln w="9525" cap="flat" cmpd="sng">
-            <a:solidFill>
-              <a:schemeClr val="dk2"/>
-            </a:solidFill>
-            <a:prstDash val="solid"/>
-            <a:round/>
-            <a:headEnd type="none" w="sm" len="sm"/>
-            <a:tailEnd type="none" w="sm" len="sm"/>
-          </a:ln>
-        </p:spPr>
-        <p:txBody>
-          <a:bodyPr spcFirstLastPara="1" wrap="square" lIns="91425" tIns="91425" rIns="91425" bIns="91425" anchor="ctr" anchorCtr="0">
-            <a:noAutofit/>
-          </a:bodyPr>
-          <a:lstStyle/>
-          <a:p>
-            <a:pPr marL="0" lvl="0" indent="0" algn="l" rtl="0">
-              <a:spcBef>
-                <a:spcPts val="0"/>
-              </a:spcBef>
-              <a:spcAft>
-                <a:spcPts val="0"/>
-              </a:spcAft>
-              <a:buNone/>
-            </a:pPr>
-            <a:endParaRPr/>
-          </a:p>
-        </p:txBody>
-      </p:sp>
-      <p:sp>
-        <p:nvSpPr>
-          <p:cNvPr id="69" name="Google Shape;69;p14"/>
-          <p:cNvSpPr txBox="1"/>
-          <p:nvPr/>
-        </p:nvSpPr>
-        <p:spPr>
-          <a:xfrm>
-            <a:off x="1391075" y="2710692"/>
-            <a:ext cx="5913000" cy="369300"/>
-          </a:xfrm>
-          <a:prstGeom prst="rect">
-            <a:avLst/>
-          </a:prstGeom>
-          <a:noFill/>
-          <a:ln>
-            <a:noFill/>
-          </a:ln>
-        </p:spPr>
-        <p:txBody>
-          <a:bodyPr spcFirstLastPara="1" wrap="square" lIns="91425" tIns="91425" rIns="91425" bIns="91425" anchor="t" anchorCtr="0">
-            <a:spAutoFit/>
-          </a:bodyPr>
-          <a:lstStyle/>
-          <a:p>
-            <a:pPr marL="0" lvl="0" indent="0" algn="l" rtl="0">
-              <a:spcBef>
-                <a:spcPts val="0"/>
-              </a:spcBef>
-              <a:spcAft>
-                <a:spcPts val="0"/>
-              </a:spcAft>
-              <a:buNone/>
-            </a:pPr>
-            <a:r>
-              <a:rPr lang="en" sz="1200">
-                <a:latin typeface="Open Sans"/>
-                <a:ea typeface="Open Sans"/>
-                <a:cs typeface="Open Sans"/>
-                <a:sym typeface="Open Sans"/>
-              </a:rPr>
-              <a:t>Recommendations</a:t>
-            </a:r>
-            <a:endParaRPr sz="1200">
-              <a:latin typeface="Open Sans"/>
-              <a:ea typeface="Open Sans"/>
-              <a:cs typeface="Open Sans"/>
-              <a:sym typeface="Open Sans"/>
-            </a:endParaRPr>
-          </a:p>
-        </p:txBody>
-      </p:sp>
-      <p:sp>
-        <p:nvSpPr>
-          <p:cNvPr id="70" name="Google Shape;70;p14"/>
-          <p:cNvSpPr/>
-          <p:nvPr/>
-        </p:nvSpPr>
-        <p:spPr>
-          <a:xfrm>
-            <a:off x="1019325" y="2839092"/>
-            <a:ext cx="285300" cy="112500"/>
-          </a:xfrm>
-          <a:prstGeom prst="rightArrow">
-            <a:avLst>
-              <a:gd name="adj1" fmla="val 50000"/>
-              <a:gd name="adj2" fmla="val 50000"/>
-            </a:avLst>
-          </a:prstGeom>
-          <a:solidFill>
-            <a:schemeClr val="dk1"/>
-          </a:solidFill>
-          <a:ln w="9525" cap="flat" cmpd="sng">
-            <a:solidFill>
-              <a:schemeClr val="dk2"/>
-            </a:solidFill>
-            <a:prstDash val="solid"/>
-            <a:round/>
-            <a:headEnd type="none" w="sm" len="sm"/>
-            <a:tailEnd type="none" w="sm" len="sm"/>
-          </a:ln>
-        </p:spPr>
-        <p:txBody>
-          <a:bodyPr spcFirstLastPara="1" wrap="square" lIns="91425" tIns="91425" rIns="91425" bIns="91425" anchor="ctr" anchorCtr="0">
-            <a:noAutofit/>
-          </a:bodyPr>
-          <a:lstStyle/>
-          <a:p>
-            <a:pPr marL="0" lvl="0" indent="0" algn="l" rtl="0">
-              <a:spcBef>
-                <a:spcPts val="0"/>
-              </a:spcBef>
-              <a:spcAft>
-                <a:spcPts val="0"/>
-              </a:spcAft>
-              <a:buNone/>
-            </a:pPr>
-            <a:endParaRPr/>
-          </a:p>
-        </p:txBody>
-      </p:sp>
-      <p:sp>
-        <p:nvSpPr>
-          <p:cNvPr id="71" name="Google Shape;71;p14"/>
-          <p:cNvSpPr txBox="1"/>
-          <p:nvPr/>
-        </p:nvSpPr>
-        <p:spPr>
-          <a:xfrm>
-            <a:off x="1391075" y="-100"/>
-            <a:ext cx="5913000" cy="400200"/>
-          </a:xfrm>
-          <a:prstGeom prst="rect">
-            <a:avLst/>
-          </a:prstGeom>
-          <a:noFill/>
-          <a:ln>
-            <a:noFill/>
-          </a:ln>
-        </p:spPr>
-        <p:txBody>
-          <a:bodyPr spcFirstLastPara="1" wrap="square" lIns="91425" tIns="91425" rIns="91425" bIns="91425" anchor="t" anchorCtr="0">
-            <a:spAutoFit/>
-          </a:bodyPr>
-          <a:lstStyle/>
-          <a:p>
-            <a:pPr marL="0" lvl="0" indent="0" algn="ctr" rtl="0">
-              <a:spcBef>
-                <a:spcPts val="0"/>
-              </a:spcBef>
-              <a:spcAft>
-                <a:spcPts val="0"/>
-              </a:spcAft>
-              <a:buNone/>
-            </a:pPr>
-            <a:r>
-              <a:rPr lang="en" b="1">
-                <a:solidFill>
-                  <a:srgbClr val="666666"/>
-                </a:solidFill>
-                <a:latin typeface="Open Sans"/>
-                <a:ea typeface="Open Sans"/>
-                <a:cs typeface="Open Sans"/>
-                <a:sym typeface="Open Sans"/>
-              </a:rPr>
-              <a:t>Table of Contents</a:t>
-            </a:r>
-            <a:endParaRPr b="1">
-              <a:solidFill>
-                <a:srgbClr val="666666"/>
-              </a:solidFill>
-              <a:latin typeface="Open Sans"/>
-              <a:ea typeface="Open Sans"/>
-              <a:cs typeface="Open Sans"/>
-              <a:sym typeface="Open Sans"/>
-            </a:endParaRPr>
-          </a:p>
-        </p:txBody>
-      </p:sp>
-      <p:sp>
-        <p:nvSpPr>
-          <p:cNvPr id="72" name="Google Shape;72;p14"/>
-          <p:cNvSpPr/>
-          <p:nvPr/>
-        </p:nvSpPr>
-        <p:spPr>
-          <a:xfrm>
-            <a:off x="3872075" y="0"/>
-            <a:ext cx="951000" cy="35700"/>
-          </a:xfrm>
-          <a:prstGeom prst="rect">
-            <a:avLst/>
-          </a:prstGeom>
-          <a:solidFill>
-            <a:schemeClr val="accent1"/>
-          </a:solidFill>
-          <a:ln>
-            <a:noFill/>
-          </a:ln>
-        </p:spPr>
-        <p:txBody>
-          <a:bodyPr spcFirstLastPara="1" wrap="square" lIns="91425" tIns="91425" rIns="91425" bIns="91425" anchor="ctr" anchorCtr="0">
-            <a:noAutofit/>
-          </a:bodyPr>
-          <a:lstStyle/>
-          <a:p>
-            <a:pPr marL="0" lvl="0" indent="0" algn="l" rtl="0">
-              <a:spcBef>
-                <a:spcPts val="0"/>
-              </a:spcBef>
-              <a:spcAft>
-                <a:spcPts val="0"/>
-              </a:spcAft>
-              <a:buNone/>
-            </a:pPr>
-            <a:endParaRPr/>
-          </a:p>
-        </p:txBody>
-      </p:sp>
-    </p:spTree>
-  </p:cSld>
-  <p:clrMapOvr>
-    <a:masterClrMapping/>
-  </p:clrMapOvr>
-</p:sld>
-</file>
-
-<file path=ppt/slides/slide20.xml><?xml version="1.0" encoding="utf-8"?>
+<file path=ppt/slides/slide21.xml><?xml version="1.0" encoding="utf-8"?>
 <p:sld xmlns:a="http://schemas.openxmlformats.org/drawingml/2006/main" xmlns:r="http://schemas.openxmlformats.org/officeDocument/2006/relationships" xmlns:p="http://schemas.openxmlformats.org/presentationml/2006/main">
   <p:cSld>
     <p:spTree>
@@ -13913,7 +14479,7 @@
           <p:nvPr>
             <p:extLst>
               <p:ext uri="{D42A27DB-BD31-4B8C-83A1-F6EECF244321}">
-                <p14:modId xmlns:p14="http://schemas.microsoft.com/office/powerpoint/2010/main" val="1121457161"/>
+                <p14:modId xmlns:p14="http://schemas.microsoft.com/office/powerpoint/2010/main" val="1246763877"/>
               </p:ext>
             </p:extLst>
           </p:nvPr>
@@ -13968,7 +14534,10 @@
                         <a:buNone/>
                       </a:pPr>
                       <a:r>
-                        <a:rPr lang="en" sz="1100" b="1">
+                        <a:rPr lang="en" sz="1100" b="1" dirty="0">
+                          <a:solidFill>
+                            <a:schemeClr val="accent1"/>
+                          </a:solidFill>
                           <a:latin typeface="Open Sans"/>
                           <a:ea typeface="Open Sans"/>
                           <a:cs typeface="Open Sans"/>
@@ -13976,7 +14545,10 @@
                         </a:rPr>
                         <a:t>#</a:t>
                       </a:r>
-                      <a:endParaRPr sz="1100" b="1">
+                      <a:endParaRPr sz="1100" b="1" dirty="0">
+                        <a:solidFill>
+                          <a:schemeClr val="accent1"/>
+                        </a:solidFill>
                         <a:latin typeface="Open Sans"/>
                         <a:ea typeface="Open Sans"/>
                         <a:cs typeface="Open Sans"/>
@@ -14038,7 +14610,10 @@
                         <a:buNone/>
                       </a:pPr>
                       <a:r>
-                        <a:rPr lang="en" sz="1100" b="1">
+                        <a:rPr lang="en" sz="1100" b="1" dirty="0">
+                          <a:solidFill>
+                            <a:schemeClr val="accent1"/>
+                          </a:solidFill>
                           <a:latin typeface="Open Sans"/>
                           <a:ea typeface="Open Sans"/>
                           <a:cs typeface="Open Sans"/>
@@ -14046,7 +14621,10 @@
                         </a:rPr>
                         <a:t>Recommendation</a:t>
                       </a:r>
-                      <a:endParaRPr sz="1100" b="1">
+                      <a:endParaRPr sz="1100" b="1" dirty="0">
+                        <a:solidFill>
+                          <a:schemeClr val="accent1"/>
+                        </a:solidFill>
                         <a:latin typeface="Open Sans"/>
                         <a:ea typeface="Open Sans"/>
                         <a:cs typeface="Open Sans"/>
@@ -14108,7 +14686,7 @@
                         <a:buNone/>
                       </a:pPr>
                       <a:r>
-                        <a:rPr lang="en" sz="1100" b="1">
+                        <a:rPr lang="en" sz="1100" b="1" dirty="0">
                           <a:solidFill>
                             <a:schemeClr val="accent1"/>
                           </a:solidFill>
@@ -14119,7 +14697,7 @@
                         </a:rPr>
                         <a:t>Description</a:t>
                       </a:r>
-                      <a:endParaRPr sz="1100" b="1">
+                      <a:endParaRPr sz="1100" b="1" dirty="0">
                         <a:solidFill>
                           <a:schemeClr val="accent1"/>
                         </a:solidFill>
@@ -15075,7 +15653,7 @@
 </p:sld>
 </file>
 
-<file path=ppt/slides/slide21.xml><?xml version="1.0" encoding="utf-8"?>
+<file path=ppt/slides/slide22.xml><?xml version="1.0" encoding="utf-8"?>
 <p:sld xmlns:a="http://schemas.openxmlformats.org/drawingml/2006/main" xmlns:r="http://schemas.openxmlformats.org/officeDocument/2006/relationships" xmlns:p="http://schemas.openxmlformats.org/presentationml/2006/main">
   <p:cSld>
     <p:spTree>
@@ -15243,6 +15821,632 @@
   <p:cSld>
     <p:spTree>
       <p:nvGrpSpPr>
+        <p:cNvPr id="1" name="Shape 101"/>
+        <p:cNvGrpSpPr/>
+        <p:nvPr/>
+      </p:nvGrpSpPr>
+      <p:grpSpPr>
+        <a:xfrm>
+          <a:off x="0" y="0"/>
+          <a:ext cx="0" cy="0"/>
+          <a:chOff x="0" y="0"/>
+          <a:chExt cx="0" cy="0"/>
+        </a:xfrm>
+      </p:grpSpPr>
+      <p:sp>
+        <p:nvSpPr>
+          <p:cNvPr id="102" name="Google Shape;102;p18"/>
+          <p:cNvSpPr/>
+          <p:nvPr/>
+        </p:nvSpPr>
+        <p:spPr>
+          <a:xfrm rot="-5400000">
+            <a:off x="-2567125" y="2549900"/>
+            <a:ext cx="5152800" cy="52800"/>
+          </a:xfrm>
+          <a:prstGeom prst="rect">
+            <a:avLst/>
+          </a:prstGeom>
+          <a:solidFill>
+            <a:schemeClr val="accent1"/>
+          </a:solidFill>
+          <a:ln>
+            <a:noFill/>
+          </a:ln>
+        </p:spPr>
+        <p:txBody>
+          <a:bodyPr spcFirstLastPara="1" wrap="square" lIns="91425" tIns="91425" rIns="91425" bIns="91425" anchor="ctr" anchorCtr="0">
+            <a:noAutofit/>
+          </a:bodyPr>
+          <a:lstStyle/>
+          <a:p>
+            <a:pPr marL="0" lvl="0" indent="0" algn="l" rtl="0">
+              <a:spcBef>
+                <a:spcPts val="0"/>
+              </a:spcBef>
+              <a:spcAft>
+                <a:spcPts val="0"/>
+              </a:spcAft>
+              <a:buNone/>
+            </a:pPr>
+            <a:endParaRPr/>
+          </a:p>
+        </p:txBody>
+      </p:sp>
+      <p:sp>
+        <p:nvSpPr>
+          <p:cNvPr id="103" name="Google Shape;103;p18"/>
+          <p:cNvSpPr txBox="1"/>
+          <p:nvPr/>
+        </p:nvSpPr>
+        <p:spPr>
+          <a:xfrm>
+            <a:off x="456675" y="135188"/>
+            <a:ext cx="5033100" cy="461635"/>
+          </a:xfrm>
+          <a:prstGeom prst="rect">
+            <a:avLst/>
+          </a:prstGeom>
+          <a:noFill/>
+          <a:ln>
+            <a:noFill/>
+          </a:ln>
+        </p:spPr>
+        <p:txBody>
+          <a:bodyPr spcFirstLastPara="1" wrap="square" lIns="91425" tIns="91425" rIns="91425" bIns="91425" anchor="t" anchorCtr="0">
+            <a:spAutoFit/>
+          </a:bodyPr>
+          <a:lstStyle/>
+          <a:p>
+            <a:pPr marL="0" lvl="0" indent="0" algn="l" rtl="0">
+              <a:spcBef>
+                <a:spcPts val="0"/>
+              </a:spcBef>
+              <a:spcAft>
+                <a:spcPts val="0"/>
+              </a:spcAft>
+              <a:buNone/>
+            </a:pPr>
+            <a:r>
+              <a:rPr lang="en-US" sz="1800" b="1" dirty="0">
+                <a:solidFill>
+                  <a:schemeClr val="accent1"/>
+                </a:solidFill>
+                <a:latin typeface="Open Sans"/>
+                <a:ea typeface="Open Sans"/>
+                <a:cs typeface="Open Sans"/>
+                <a:sym typeface="Open Sans"/>
+              </a:rPr>
+              <a:t>Executive Summary</a:t>
+            </a:r>
+            <a:endParaRPr sz="1800" b="1" dirty="0">
+              <a:solidFill>
+                <a:schemeClr val="accent1"/>
+              </a:solidFill>
+              <a:latin typeface="Open Sans"/>
+              <a:ea typeface="Open Sans"/>
+              <a:cs typeface="Open Sans"/>
+              <a:sym typeface="Open Sans"/>
+            </a:endParaRPr>
+          </a:p>
+        </p:txBody>
+      </p:sp>
+      <p:sp>
+        <p:nvSpPr>
+          <p:cNvPr id="2" name="Google Shape;103;p18">
+            <a:extLst>
+              <a:ext uri="{FF2B5EF4-FFF2-40B4-BE49-F238E27FC236}">
+                <a16:creationId xmlns:a16="http://schemas.microsoft.com/office/drawing/2014/main" id="{060E110F-A8AD-1B5E-EB6F-7B7EDB03C882}"/>
+              </a:ext>
+            </a:extLst>
+          </p:cNvPr>
+          <p:cNvSpPr txBox="1"/>
+          <p:nvPr/>
+        </p:nvSpPr>
+        <p:spPr>
+          <a:xfrm>
+            <a:off x="456675" y="541019"/>
+            <a:ext cx="8230124" cy="553968"/>
+          </a:xfrm>
+          <a:prstGeom prst="rect">
+            <a:avLst/>
+          </a:prstGeom>
+          <a:noFill/>
+          <a:ln>
+            <a:noFill/>
+          </a:ln>
+        </p:spPr>
+        <p:txBody>
+          <a:bodyPr spcFirstLastPara="1" wrap="square" lIns="91425" tIns="91425" rIns="91425" bIns="91425" anchor="t" anchorCtr="0">
+            <a:spAutoFit/>
+          </a:bodyPr>
+          <a:lstStyle/>
+          <a:p>
+            <a:pPr marL="0" lvl="0" indent="0" algn="l" rtl="0">
+              <a:spcBef>
+                <a:spcPts val="0"/>
+              </a:spcBef>
+              <a:spcAft>
+                <a:spcPts val="0"/>
+              </a:spcAft>
+              <a:buNone/>
+            </a:pPr>
+            <a:r>
+              <a:rPr lang="en-US" sz="1200" b="1" dirty="0">
+                <a:solidFill>
+                  <a:schemeClr val="accent1"/>
+                </a:solidFill>
+                <a:latin typeface="Open Sans"/>
+                <a:ea typeface="Open Sans"/>
+                <a:cs typeface="Open Sans"/>
+                <a:sym typeface="Open Sans"/>
+              </a:rPr>
+              <a:t>The analytics goal </a:t>
+            </a:r>
+            <a:r>
+              <a:rPr lang="en-US" sz="1200" dirty="0">
+                <a:solidFill>
+                  <a:schemeClr val="tx1"/>
+                </a:solidFill>
+                <a:latin typeface="Open Sans"/>
+                <a:ea typeface="Open Sans"/>
+                <a:cs typeface="Open Sans"/>
+                <a:sym typeface="Open Sans"/>
+              </a:rPr>
+              <a:t>is to identify </a:t>
+            </a:r>
+            <a:r>
+              <a:rPr lang="en" sz="1200" dirty="0">
+                <a:solidFill>
+                  <a:schemeClr val="tx1"/>
+                </a:solidFill>
+                <a:latin typeface="Open Sans"/>
+                <a:ea typeface="Open Sans"/>
+                <a:cs typeface="Open Sans"/>
+                <a:sym typeface="Open Sans"/>
+              </a:rPr>
+              <a:t>(1) trends in the health-tracking devices market, (2) lever the trends to help Bellabeat’s customers/products, and (3) formulate marketing strategies based on these trends.</a:t>
+            </a:r>
+            <a:endParaRPr lang="en-US" sz="1200" dirty="0">
+              <a:solidFill>
+                <a:schemeClr val="tx1"/>
+              </a:solidFill>
+              <a:latin typeface="Open Sans"/>
+              <a:ea typeface="Open Sans"/>
+              <a:cs typeface="Open Sans"/>
+              <a:sym typeface="Open Sans"/>
+            </a:endParaRPr>
+          </a:p>
+        </p:txBody>
+      </p:sp>
+      <p:sp>
+        <p:nvSpPr>
+          <p:cNvPr id="3" name="Google Shape;105;p18">
+            <a:extLst>
+              <a:ext uri="{FF2B5EF4-FFF2-40B4-BE49-F238E27FC236}">
+                <a16:creationId xmlns:a16="http://schemas.microsoft.com/office/drawing/2014/main" id="{DF3A6179-EE99-32B2-E85A-41C578FECCCA}"/>
+              </a:ext>
+            </a:extLst>
+          </p:cNvPr>
+          <p:cNvSpPr txBox="1"/>
+          <p:nvPr/>
+        </p:nvSpPr>
+        <p:spPr>
+          <a:xfrm>
+            <a:off x="456676" y="3023893"/>
+            <a:ext cx="8230124" cy="1854323"/>
+          </a:xfrm>
+          <a:prstGeom prst="rect">
+            <a:avLst/>
+          </a:prstGeom>
+          <a:noFill/>
+          <a:ln>
+            <a:noFill/>
+          </a:ln>
+        </p:spPr>
+        <p:txBody>
+          <a:bodyPr spcFirstLastPara="1" wrap="square" lIns="91425" tIns="91425" rIns="91425" bIns="91425" anchor="t" anchorCtr="0">
+            <a:spAutoFit/>
+          </a:bodyPr>
+          <a:lstStyle/>
+          <a:p>
+            <a:pPr lvl="0" indent="-304800" algn="just" rtl="0">
+              <a:spcBef>
+                <a:spcPts val="300"/>
+              </a:spcBef>
+              <a:spcAft>
+                <a:spcPts val="0"/>
+              </a:spcAft>
+              <a:buSzPts val="1200"/>
+              <a:buFont typeface="Open Sans"/>
+              <a:buChar char="●"/>
+            </a:pPr>
+            <a:r>
+              <a:rPr lang="en" sz="1200" dirty="0">
+                <a:latin typeface="Open Sans"/>
+                <a:ea typeface="Open Sans"/>
+                <a:cs typeface="Open Sans"/>
+                <a:sym typeface="Open Sans"/>
+              </a:rPr>
+              <a:t>50% of the sample responses use more than 70% of the sample month (high-use users), while 38% use less than 30% of that (low-use users). </a:t>
+            </a:r>
+            <a:endParaRPr lang="en" sz="1200" dirty="0">
+              <a:solidFill>
+                <a:schemeClr val="tx1"/>
+              </a:solidFill>
+              <a:latin typeface="Open Sans"/>
+              <a:ea typeface="Open Sans"/>
+              <a:cs typeface="Open Sans"/>
+              <a:sym typeface="Open Sans"/>
+            </a:endParaRPr>
+          </a:p>
+          <a:p>
+            <a:pPr lvl="0" indent="-304800" algn="just" rtl="0">
+              <a:spcBef>
+                <a:spcPts val="300"/>
+              </a:spcBef>
+              <a:spcAft>
+                <a:spcPts val="0"/>
+              </a:spcAft>
+              <a:buSzPts val="1200"/>
+              <a:buFont typeface="Open Sans"/>
+              <a:buChar char="●"/>
+            </a:pPr>
+            <a:r>
+              <a:rPr lang="en" sz="1200" dirty="0">
+                <a:solidFill>
+                  <a:schemeClr val="tx1"/>
+                </a:solidFill>
+                <a:latin typeface="Open Sans"/>
+                <a:ea typeface="Open Sans"/>
+                <a:cs typeface="Open Sans"/>
+                <a:sym typeface="Open Sans"/>
+              </a:rPr>
+              <a:t>All users sleep less than the standard amount of 8 hours (480 minutes). </a:t>
+            </a:r>
+          </a:p>
+          <a:p>
+            <a:pPr lvl="0" indent="-304800" algn="just" rtl="0">
+              <a:spcBef>
+                <a:spcPts val="300"/>
+              </a:spcBef>
+              <a:spcAft>
+                <a:spcPts val="0"/>
+              </a:spcAft>
+              <a:buSzPts val="1200"/>
+              <a:buFont typeface="Open Sans"/>
+              <a:buChar char="●"/>
+            </a:pPr>
+            <a:r>
+              <a:rPr lang="en" sz="1200" dirty="0">
+                <a:solidFill>
+                  <a:schemeClr val="tx1"/>
+                </a:solidFill>
+                <a:latin typeface="Open Sans"/>
+                <a:ea typeface="Open Sans"/>
+                <a:cs typeface="Open Sans"/>
+                <a:sym typeface="Open Sans"/>
+              </a:rPr>
+              <a:t>Most users once use the devices keep them on for more than half of the day (12 hours) </a:t>
+            </a:r>
+          </a:p>
+          <a:p>
+            <a:pPr indent="-304800" algn="just">
+              <a:spcBef>
+                <a:spcPts val="300"/>
+              </a:spcBef>
+              <a:buSzPts val="1200"/>
+              <a:buFont typeface="Open Sans"/>
+              <a:buChar char="●"/>
+            </a:pPr>
+            <a:r>
+              <a:rPr lang="en" sz="1200" dirty="0">
+                <a:solidFill>
+                  <a:schemeClr val="tx1"/>
+                </a:solidFill>
+                <a:latin typeface="Open Sans"/>
+                <a:ea typeface="Open Sans"/>
+                <a:cs typeface="Open Sans"/>
+                <a:sym typeface="Open Sans"/>
+              </a:rPr>
+              <a:t>Users wearing the devices more than 70% of the month (high-use) have more steps taken per day, while users wearing the devices less than 30% of the month (low-use) have </a:t>
+            </a:r>
+            <a:r>
+              <a:rPr lang="en-US" sz="1200" dirty="0">
+                <a:solidFill>
+                  <a:schemeClr val="dk1"/>
+                </a:solidFill>
+              </a:rPr>
+              <a:t>higher calories burnt and less sleep time compared to average figures.</a:t>
+            </a:r>
+          </a:p>
+          <a:p>
+            <a:pPr indent="-304800" algn="just">
+              <a:spcBef>
+                <a:spcPts val="300"/>
+              </a:spcBef>
+              <a:buSzPts val="1200"/>
+              <a:buFont typeface="Open Sans"/>
+              <a:buChar char="●"/>
+            </a:pPr>
+            <a:r>
+              <a:rPr lang="en-US" sz="1200" dirty="0">
+                <a:solidFill>
+                  <a:schemeClr val="dk1"/>
+                </a:solidFill>
+              </a:rPr>
+              <a:t>Key proposition of </a:t>
+            </a:r>
+            <a:r>
+              <a:rPr lang="en-US" sz="1200" dirty="0" err="1">
+                <a:solidFill>
+                  <a:schemeClr val="dk1"/>
+                </a:solidFill>
+              </a:rPr>
+              <a:t>Bellabeat’s</a:t>
+            </a:r>
+            <a:r>
+              <a:rPr lang="en-US" sz="1200" dirty="0">
+                <a:solidFill>
+                  <a:schemeClr val="dk1"/>
+                </a:solidFill>
+              </a:rPr>
+              <a:t> products is that are both health-conscious and fashionable for women.</a:t>
+            </a:r>
+          </a:p>
+        </p:txBody>
+      </p:sp>
+      <p:sp>
+        <p:nvSpPr>
+          <p:cNvPr id="4" name="Google Shape;103;p18">
+            <a:extLst>
+              <a:ext uri="{FF2B5EF4-FFF2-40B4-BE49-F238E27FC236}">
+                <a16:creationId xmlns:a16="http://schemas.microsoft.com/office/drawing/2014/main" id="{0AA784F0-7EE3-82F5-4139-89DBD0209E36}"/>
+              </a:ext>
+            </a:extLst>
+          </p:cNvPr>
+          <p:cNvSpPr txBox="1"/>
+          <p:nvPr/>
+        </p:nvSpPr>
+        <p:spPr>
+          <a:xfrm>
+            <a:off x="456675" y="2775576"/>
+            <a:ext cx="8230124" cy="369302"/>
+          </a:xfrm>
+          <a:prstGeom prst="rect">
+            <a:avLst/>
+          </a:prstGeom>
+          <a:noFill/>
+          <a:ln>
+            <a:noFill/>
+          </a:ln>
+        </p:spPr>
+        <p:txBody>
+          <a:bodyPr spcFirstLastPara="1" wrap="square" lIns="91425" tIns="91425" rIns="91425" bIns="91425" anchor="t" anchorCtr="0">
+            <a:spAutoFit/>
+          </a:bodyPr>
+          <a:lstStyle/>
+          <a:p>
+            <a:pPr marL="0" lvl="0" indent="0" algn="l" rtl="0">
+              <a:spcBef>
+                <a:spcPts val="0"/>
+              </a:spcBef>
+              <a:spcAft>
+                <a:spcPts val="0"/>
+              </a:spcAft>
+              <a:buNone/>
+            </a:pPr>
+            <a:r>
+              <a:rPr lang="en-US" sz="1200" b="1" dirty="0">
+                <a:solidFill>
+                  <a:schemeClr val="accent1"/>
+                </a:solidFill>
+                <a:latin typeface="Open Sans"/>
+                <a:ea typeface="Open Sans"/>
+                <a:cs typeface="Open Sans"/>
+                <a:sym typeface="Open Sans"/>
+              </a:rPr>
+              <a:t>Key insights:</a:t>
+            </a:r>
+            <a:endParaRPr sz="1200" dirty="0">
+              <a:solidFill>
+                <a:schemeClr val="tx1"/>
+              </a:solidFill>
+              <a:latin typeface="Open Sans"/>
+              <a:ea typeface="Open Sans"/>
+              <a:cs typeface="Open Sans"/>
+              <a:sym typeface="Open Sans"/>
+            </a:endParaRPr>
+          </a:p>
+        </p:txBody>
+      </p:sp>
+      <p:sp>
+        <p:nvSpPr>
+          <p:cNvPr id="5" name="Google Shape;105;p18">
+            <a:extLst>
+              <a:ext uri="{FF2B5EF4-FFF2-40B4-BE49-F238E27FC236}">
+                <a16:creationId xmlns:a16="http://schemas.microsoft.com/office/drawing/2014/main" id="{F026992B-A001-6053-6DB3-65E14B8D4E9D}"/>
+              </a:ext>
+            </a:extLst>
+          </p:cNvPr>
+          <p:cNvSpPr txBox="1"/>
+          <p:nvPr/>
+        </p:nvSpPr>
+        <p:spPr>
+          <a:xfrm>
+            <a:off x="456676" y="1282425"/>
+            <a:ext cx="8230124" cy="1592713"/>
+          </a:xfrm>
+          <a:prstGeom prst="rect">
+            <a:avLst/>
+          </a:prstGeom>
+          <a:noFill/>
+          <a:ln>
+            <a:noFill/>
+          </a:ln>
+        </p:spPr>
+        <p:txBody>
+          <a:bodyPr spcFirstLastPara="1" wrap="square" lIns="91425" tIns="91425" rIns="91425" bIns="91425" anchor="t" anchorCtr="0">
+            <a:spAutoFit/>
+          </a:bodyPr>
+          <a:lstStyle/>
+          <a:p>
+            <a:pPr lvl="0" indent="-304800" algn="just" rtl="0">
+              <a:spcBef>
+                <a:spcPts val="300"/>
+              </a:spcBef>
+              <a:spcAft>
+                <a:spcPts val="0"/>
+              </a:spcAft>
+              <a:buSzPts val="1200"/>
+              <a:buFont typeface="Open Sans"/>
+              <a:buChar char="●"/>
+            </a:pPr>
+            <a:r>
+              <a:rPr lang="en-US" sz="1200" dirty="0">
+                <a:solidFill>
+                  <a:schemeClr val="dk1"/>
+                </a:solidFill>
+                <a:latin typeface="Open Sans" panose="020B0606030504020204" pitchFamily="34" charset="0"/>
+                <a:ea typeface="Open Sans" panose="020B0606030504020204" pitchFamily="34" charset="0"/>
+                <a:cs typeface="Open Sans" panose="020B0606030504020204" pitchFamily="34" charset="0"/>
+                <a:sym typeface="Open Sans"/>
+              </a:rPr>
+              <a:t>“Daily Challenge” campaign or feature (long-term) helps engage all users to wear the devices and keep track of their health, especially to encourage the importance of health tracking to low-use users (wear devices less than 30% of the days in a month).</a:t>
+            </a:r>
+          </a:p>
+          <a:p>
+            <a:pPr lvl="0" indent="-304800" algn="just" rtl="0">
+              <a:spcBef>
+                <a:spcPts val="300"/>
+              </a:spcBef>
+              <a:spcAft>
+                <a:spcPts val="0"/>
+              </a:spcAft>
+              <a:buSzPts val="1200"/>
+              <a:buFont typeface="Open Sans"/>
+              <a:buChar char="●"/>
+            </a:pPr>
+            <a:r>
+              <a:rPr lang="en-US" sz="1200" dirty="0">
+                <a:solidFill>
+                  <a:schemeClr val="dk1"/>
+                </a:solidFill>
+                <a:latin typeface="Open Sans" panose="020B0606030504020204" pitchFamily="34" charset="0"/>
+                <a:ea typeface="Open Sans" panose="020B0606030504020204" pitchFamily="34" charset="0"/>
+                <a:cs typeface="Open Sans" panose="020B0606030504020204" pitchFamily="34" charset="0"/>
+              </a:rPr>
+              <a:t>“Sleep notification” CRM message/function keeps track of the sleep time of users. This message reminds users to analyze detailed activities during the day and gives valuable insights into adjusting them to spend more time on sleep. </a:t>
+            </a:r>
+          </a:p>
+          <a:p>
+            <a:pPr lvl="0" indent="-304800" algn="just" rtl="0">
+              <a:spcBef>
+                <a:spcPts val="300"/>
+              </a:spcBef>
+              <a:spcAft>
+                <a:spcPts val="0"/>
+              </a:spcAft>
+              <a:buSzPts val="1200"/>
+              <a:buFont typeface="Open Sans"/>
+              <a:buChar char="●"/>
+            </a:pPr>
+            <a:r>
+              <a:rPr lang="en-US" sz="1200" dirty="0">
+                <a:solidFill>
+                  <a:schemeClr val="dk1"/>
+                </a:solidFill>
+                <a:latin typeface="Open Sans" panose="020B0606030504020204" pitchFamily="34" charset="0"/>
+                <a:ea typeface="Open Sans" panose="020B0606030504020204" pitchFamily="34" charset="0"/>
+                <a:cs typeface="Open Sans" panose="020B0606030504020204" pitchFamily="34" charset="0"/>
+              </a:rPr>
+              <a:t>Partnership with fashion brands to promote a healthy and fashionable lifestyle. </a:t>
+            </a:r>
+          </a:p>
+        </p:txBody>
+      </p:sp>
+      <p:sp>
+        <p:nvSpPr>
+          <p:cNvPr id="6" name="Google Shape;103;p18">
+            <a:extLst>
+              <a:ext uri="{FF2B5EF4-FFF2-40B4-BE49-F238E27FC236}">
+                <a16:creationId xmlns:a16="http://schemas.microsoft.com/office/drawing/2014/main" id="{B9721339-9D22-8AA3-F54B-F889D2752CF1}"/>
+              </a:ext>
+            </a:extLst>
+          </p:cNvPr>
+          <p:cNvSpPr txBox="1"/>
+          <p:nvPr/>
+        </p:nvSpPr>
+        <p:spPr>
+          <a:xfrm>
+            <a:off x="456675" y="1058409"/>
+            <a:ext cx="8230124" cy="369302"/>
+          </a:xfrm>
+          <a:prstGeom prst="rect">
+            <a:avLst/>
+          </a:prstGeom>
+          <a:noFill/>
+          <a:ln>
+            <a:noFill/>
+          </a:ln>
+        </p:spPr>
+        <p:txBody>
+          <a:bodyPr spcFirstLastPara="1" wrap="square" lIns="91425" tIns="91425" rIns="91425" bIns="91425" anchor="t" anchorCtr="0">
+            <a:spAutoFit/>
+          </a:bodyPr>
+          <a:lstStyle/>
+          <a:p>
+            <a:pPr marL="0" lvl="0" indent="0" algn="l" rtl="0">
+              <a:spcBef>
+                <a:spcPts val="0"/>
+              </a:spcBef>
+              <a:spcAft>
+                <a:spcPts val="0"/>
+              </a:spcAft>
+              <a:buNone/>
+            </a:pPr>
+            <a:r>
+              <a:rPr lang="en-US" sz="1200" b="1" dirty="0">
+                <a:solidFill>
+                  <a:schemeClr val="accent1"/>
+                </a:solidFill>
+                <a:latin typeface="Open Sans"/>
+                <a:ea typeface="Open Sans"/>
+                <a:cs typeface="Open Sans"/>
+                <a:sym typeface="Open Sans"/>
+              </a:rPr>
+              <a:t>Key recommendations:</a:t>
+            </a:r>
+            <a:endParaRPr sz="1200" dirty="0">
+              <a:solidFill>
+                <a:schemeClr val="tx1"/>
+              </a:solidFill>
+              <a:latin typeface="Open Sans"/>
+              <a:ea typeface="Open Sans"/>
+              <a:cs typeface="Open Sans"/>
+              <a:sym typeface="Open Sans"/>
+            </a:endParaRPr>
+          </a:p>
+        </p:txBody>
+      </p:sp>
+    </p:spTree>
+    <p:extLst>
+      <p:ext uri="{BB962C8B-B14F-4D97-AF65-F5344CB8AC3E}">
+        <p14:creationId xmlns:p14="http://schemas.microsoft.com/office/powerpoint/2010/main" val="301238709"/>
+      </p:ext>
+    </p:extLst>
+  </p:cSld>
+  <p:clrMapOvr>
+    <a:masterClrMapping/>
+  </p:clrMapOvr>
+</p:sld>
+</file>
+
+<file path=ppt/slides/slide4.xml><?xml version="1.0" encoding="utf-8"?>
+<p:sld xmlns:a="http://schemas.openxmlformats.org/drawingml/2006/main" xmlns:r="http://schemas.openxmlformats.org/officeDocument/2006/relationships" xmlns:p="http://schemas.openxmlformats.org/presentationml/2006/main">
+  <p:cSld>
+    <p:spTree>
+      <p:nvGrpSpPr>
         <p:cNvPr id="1" name="Shape 76"/>
         <p:cNvGrpSpPr/>
         <p:nvPr/>
@@ -15370,7 +16574,7 @@
               <a:buNone/>
             </a:pPr>
             <a:r>
-              <a:rPr lang="en" sz="3200" b="1">
+              <a:rPr lang="en" sz="3200" b="1" dirty="0">
                 <a:solidFill>
                   <a:schemeClr val="lt1"/>
                 </a:solidFill>
@@ -15379,9 +16583,9 @@
                 <a:cs typeface="Open Sans"/>
                 <a:sym typeface="Open Sans"/>
               </a:rPr>
-              <a:t>Objectives</a:t>
+              <a:t>Analytics goals</a:t>
             </a:r>
-            <a:endParaRPr sz="3200" b="1">
+            <a:endParaRPr sz="3200" b="1" dirty="0">
               <a:solidFill>
                 <a:schemeClr val="lt1"/>
               </a:solidFill>
@@ -15401,7 +16605,7 @@
 </p:sld>
 </file>
 
-<file path=ppt/slides/slide4.xml><?xml version="1.0" encoding="utf-8"?>
+<file path=ppt/slides/slide5.xml><?xml version="1.0" encoding="utf-8"?>
 <p:sld xmlns:a="http://schemas.openxmlformats.org/drawingml/2006/main" xmlns:r="http://schemas.openxmlformats.org/officeDocument/2006/relationships" xmlns:p="http://schemas.openxmlformats.org/presentationml/2006/main">
   <p:cSld>
     <p:spTree>
@@ -15900,7 +17104,7 @@
               <a:buNone/>
             </a:pPr>
             <a:r>
-              <a:rPr lang="en" sz="1800" b="1">
+              <a:rPr lang="en" sz="1800" b="1" dirty="0">
                 <a:solidFill>
                   <a:schemeClr val="accent1"/>
                 </a:solidFill>
@@ -15909,9 +17113,9 @@
                 <a:cs typeface="Open Sans"/>
                 <a:sym typeface="Open Sans"/>
               </a:rPr>
-              <a:t>Business Objectives</a:t>
+              <a:t>Analytics goals</a:t>
             </a:r>
-            <a:endParaRPr sz="1800" b="1">
+            <a:endParaRPr sz="1800" b="1" dirty="0">
               <a:solidFill>
                 <a:schemeClr val="accent1"/>
               </a:solidFill>
@@ -16225,7 +17429,7 @@
 </p:sld>
 </file>
 
-<file path=ppt/slides/slide5.xml><?xml version="1.0" encoding="utf-8"?>
+<file path=ppt/slides/slide6.xml><?xml version="1.0" encoding="utf-8"?>
 <p:sld xmlns:a="http://schemas.openxmlformats.org/drawingml/2006/main" xmlns:r="http://schemas.openxmlformats.org/officeDocument/2006/relationships" xmlns:p="http://schemas.openxmlformats.org/presentationml/2006/main">
   <p:cSld>
     <p:spTree>
@@ -16388,7 +17592,7 @@
 </p:sld>
 </file>
 
-<file path=ppt/slides/slide6.xml><?xml version="1.0" encoding="utf-8"?>
+<file path=ppt/slides/slide7.xml><?xml version="1.0" encoding="utf-8"?>
 <p:sld xmlns:a="http://schemas.openxmlformats.org/drawingml/2006/main" xmlns:r="http://schemas.openxmlformats.org/officeDocument/2006/relationships" xmlns:p="http://schemas.openxmlformats.org/presentationml/2006/main">
   <p:cSld>
     <p:spTree>
@@ -17974,7 +19178,7 @@
 </p:sld>
 </file>
 
-<file path=ppt/slides/slide7.xml><?xml version="1.0" encoding="utf-8"?>
+<file path=ppt/slides/slide8.xml><?xml version="1.0" encoding="utf-8"?>
 <p:sld xmlns:a="http://schemas.openxmlformats.org/drawingml/2006/main" xmlns:r="http://schemas.openxmlformats.org/officeDocument/2006/relationships" xmlns:p="http://schemas.openxmlformats.org/presentationml/2006/main">
   <p:cSld>
     <p:spTree>
@@ -18316,7 +19520,7 @@
 </p:sld>
 </file>
 
-<file path=ppt/slides/slide8.xml><?xml version="1.0" encoding="utf-8"?>
+<file path=ppt/slides/slide9.xml><?xml version="1.0" encoding="utf-8"?>
 <p:sld xmlns:a="http://schemas.openxmlformats.org/drawingml/2006/main" xmlns:r="http://schemas.openxmlformats.org/officeDocument/2006/relationships" xmlns:p="http://schemas.openxmlformats.org/presentationml/2006/main">
   <p:cSld>
     <p:spTree>
@@ -18621,348 +19825,6 @@
                                         <p:cTn id="7" dur="1000"/>
                                         <p:tgtEl>
                                           <p:spTgt spid="139"/>
-                                        </p:tgtEl>
-                                      </p:cBhvr>
-                                    </p:animEffect>
-                                  </p:childTnLst>
-                                </p:cTn>
-                              </p:par>
-                            </p:childTnLst>
-                          </p:cTn>
-                        </p:par>
-                      </p:childTnLst>
-                    </p:cTn>
-                  </p:par>
-                </p:childTnLst>
-              </p:cTn>
-              <p:prevCondLst>
-                <p:cond evt="onPrev" delay="0">
-                  <p:tgtEl>
-                    <p:sldTgt/>
-                  </p:tgtEl>
-                </p:cond>
-              </p:prevCondLst>
-              <p:nextCondLst>
-                <p:cond evt="onNext" delay="0">
-                  <p:tgtEl>
-                    <p:sldTgt/>
-                  </p:tgtEl>
-                </p:cond>
-              </p:nextCondLst>
-            </p:seq>
-          </p:childTnLst>
-        </p:cTn>
-      </p:par>
-    </p:tnLst>
-  </p:timing>
-</p:sld>
-</file>
-
-<file path=ppt/slides/slide9.xml><?xml version="1.0" encoding="utf-8"?>
-<p:sld xmlns:a="http://schemas.openxmlformats.org/drawingml/2006/main" xmlns:r="http://schemas.openxmlformats.org/officeDocument/2006/relationships" xmlns:p="http://schemas.openxmlformats.org/presentationml/2006/main">
-  <p:cSld>
-    <p:spTree>
-      <p:nvGrpSpPr>
-        <p:cNvPr id="1" name="Shape 145"/>
-        <p:cNvGrpSpPr/>
-        <p:nvPr/>
-      </p:nvGrpSpPr>
-      <p:grpSpPr>
-        <a:xfrm>
-          <a:off x="0" y="0"/>
-          <a:ext cx="0" cy="0"/>
-          <a:chOff x="0" y="0"/>
-          <a:chExt cx="0" cy="0"/>
-        </a:xfrm>
-      </p:grpSpPr>
-      <p:sp>
-        <p:nvSpPr>
-          <p:cNvPr id="146" name="Google Shape;146;p21"/>
-          <p:cNvSpPr/>
-          <p:nvPr/>
-        </p:nvSpPr>
-        <p:spPr>
-          <a:xfrm rot="-5400000">
-            <a:off x="-2567125" y="2549900"/>
-            <a:ext cx="5152800" cy="52800"/>
-          </a:xfrm>
-          <a:prstGeom prst="rect">
-            <a:avLst/>
-          </a:prstGeom>
-          <a:solidFill>
-            <a:schemeClr val="accent1"/>
-          </a:solidFill>
-          <a:ln>
-            <a:noFill/>
-          </a:ln>
-        </p:spPr>
-        <p:txBody>
-          <a:bodyPr spcFirstLastPara="1" wrap="square" lIns="91425" tIns="91425" rIns="91425" bIns="91425" anchor="ctr" anchorCtr="0">
-            <a:noAutofit/>
-          </a:bodyPr>
-          <a:lstStyle/>
-          <a:p>
-            <a:pPr marL="0" lvl="0" indent="0" algn="l" rtl="0">
-              <a:spcBef>
-                <a:spcPts val="0"/>
-              </a:spcBef>
-              <a:spcAft>
-                <a:spcPts val="0"/>
-              </a:spcAft>
-              <a:buNone/>
-            </a:pPr>
-            <a:endParaRPr/>
-          </a:p>
-        </p:txBody>
-      </p:sp>
-      <p:sp>
-        <p:nvSpPr>
-          <p:cNvPr id="147" name="Google Shape;147;p21"/>
-          <p:cNvSpPr txBox="1"/>
-          <p:nvPr/>
-        </p:nvSpPr>
-        <p:spPr>
-          <a:xfrm>
-            <a:off x="235225" y="983925"/>
-            <a:ext cx="8807700" cy="461700"/>
-          </a:xfrm>
-          <a:prstGeom prst="rect">
-            <a:avLst/>
-          </a:prstGeom>
-          <a:noFill/>
-          <a:ln>
-            <a:noFill/>
-          </a:ln>
-        </p:spPr>
-        <p:txBody>
-          <a:bodyPr spcFirstLastPara="1" wrap="square" lIns="91425" tIns="91425" rIns="91425" bIns="91425" anchor="t" anchorCtr="0">
-            <a:spAutoFit/>
-          </a:bodyPr>
-          <a:lstStyle/>
-          <a:p>
-            <a:pPr marL="0" lvl="0" indent="0" algn="l" rtl="0">
-              <a:spcBef>
-                <a:spcPts val="0"/>
-              </a:spcBef>
-              <a:spcAft>
-                <a:spcPts val="0"/>
-              </a:spcAft>
-              <a:buNone/>
-            </a:pPr>
-            <a:r>
-              <a:rPr lang="en" sz="1800" b="1">
-                <a:solidFill>
-                  <a:schemeClr val="accent1"/>
-                </a:solidFill>
-                <a:latin typeface="Open Sans"/>
-                <a:ea typeface="Open Sans"/>
-                <a:cs typeface="Open Sans"/>
-                <a:sym typeface="Open Sans"/>
-              </a:rPr>
-              <a:t>Hourly steps and hourly calories</a:t>
-            </a:r>
-            <a:endParaRPr sz="1800" b="1">
-              <a:solidFill>
-                <a:schemeClr val="accent1"/>
-              </a:solidFill>
-              <a:latin typeface="Open Sans"/>
-              <a:ea typeface="Open Sans"/>
-              <a:cs typeface="Open Sans"/>
-              <a:sym typeface="Open Sans"/>
-            </a:endParaRPr>
-          </a:p>
-        </p:txBody>
-      </p:sp>
-      <p:sp>
-        <p:nvSpPr>
-          <p:cNvPr id="148" name="Google Shape;148;p21"/>
-          <p:cNvSpPr txBox="1"/>
-          <p:nvPr/>
-        </p:nvSpPr>
-        <p:spPr>
-          <a:xfrm>
-            <a:off x="235225" y="2299250"/>
-            <a:ext cx="4117200" cy="554100"/>
-          </a:xfrm>
-          <a:prstGeom prst="rect">
-            <a:avLst/>
-          </a:prstGeom>
-          <a:noFill/>
-          <a:ln>
-            <a:noFill/>
-          </a:ln>
-        </p:spPr>
-        <p:txBody>
-          <a:bodyPr spcFirstLastPara="1" wrap="square" lIns="91425" tIns="91425" rIns="91425" bIns="91425" anchor="t" anchorCtr="0">
-            <a:spAutoFit/>
-          </a:bodyPr>
-          <a:lstStyle/>
-          <a:p>
-            <a:pPr marL="342900" lvl="0" indent="-304800" algn="just" rtl="0">
-              <a:lnSpc>
-                <a:spcPct val="100000"/>
-              </a:lnSpc>
-              <a:spcBef>
-                <a:spcPts val="0"/>
-              </a:spcBef>
-              <a:spcAft>
-                <a:spcPts val="0"/>
-              </a:spcAft>
-              <a:buClr>
-                <a:schemeClr val="dk1"/>
-              </a:buClr>
-              <a:buSzPts val="1200"/>
-              <a:buFont typeface="Open Sans"/>
-              <a:buChar char="●"/>
-            </a:pPr>
-            <a:r>
-              <a:rPr lang="en" sz="1200">
-                <a:solidFill>
-                  <a:schemeClr val="dk1"/>
-                </a:solidFill>
-                <a:latin typeface="Open Sans"/>
-                <a:ea typeface="Open Sans"/>
-                <a:cs typeface="Open Sans"/>
-                <a:sym typeface="Open Sans"/>
-              </a:rPr>
-              <a:t>When considered on an hourly basis, steps taken and calories burnt are almost perfectly correlated.</a:t>
-            </a:r>
-            <a:endParaRPr sz="1200">
-              <a:solidFill>
-                <a:schemeClr val="dk1"/>
-              </a:solidFill>
-              <a:latin typeface="Open Sans"/>
-              <a:ea typeface="Open Sans"/>
-              <a:cs typeface="Open Sans"/>
-              <a:sym typeface="Open Sans"/>
-            </a:endParaRPr>
-          </a:p>
-        </p:txBody>
-      </p:sp>
-      <p:pic>
-        <p:nvPicPr>
-          <p:cNvPr id="149" name="Google Shape;149;p21"/>
-          <p:cNvPicPr preferRelativeResize="0"/>
-          <p:nvPr/>
-        </p:nvPicPr>
-        <p:blipFill>
-          <a:blip r:embed="rId3">
-            <a:alphaModFix/>
-          </a:blip>
-          <a:stretch>
-            <a:fillRect/>
-          </a:stretch>
-        </p:blipFill>
-        <p:spPr>
-          <a:xfrm>
-            <a:off x="4352425" y="1598025"/>
-            <a:ext cx="4639175" cy="2863034"/>
-          </a:xfrm>
-          <a:prstGeom prst="rect">
-            <a:avLst/>
-          </a:prstGeom>
-          <a:noFill/>
-          <a:ln>
-            <a:noFill/>
-          </a:ln>
-        </p:spPr>
-      </p:pic>
-      <p:sp>
-        <p:nvSpPr>
-          <p:cNvPr id="150" name="Google Shape;150;p21"/>
-          <p:cNvSpPr txBox="1"/>
-          <p:nvPr/>
-        </p:nvSpPr>
-        <p:spPr>
-          <a:xfrm>
-            <a:off x="276100" y="4745250"/>
-            <a:ext cx="7566900" cy="323100"/>
-          </a:xfrm>
-          <a:prstGeom prst="rect">
-            <a:avLst/>
-          </a:prstGeom>
-          <a:noFill/>
-          <a:ln>
-            <a:noFill/>
-          </a:ln>
-        </p:spPr>
-        <p:txBody>
-          <a:bodyPr spcFirstLastPara="1" wrap="square" lIns="91425" tIns="91425" rIns="91425" bIns="91425" anchor="t" anchorCtr="0">
-            <a:spAutoFit/>
-          </a:bodyPr>
-          <a:lstStyle/>
-          <a:p>
-            <a:pPr marL="0" lvl="0" indent="0" algn="l" rtl="0">
-              <a:spcBef>
-                <a:spcPts val="0"/>
-              </a:spcBef>
-              <a:spcAft>
-                <a:spcPts val="0"/>
-              </a:spcAft>
-              <a:buNone/>
-            </a:pPr>
-            <a:r>
-              <a:rPr lang="en" sz="900" i="1"/>
-              <a:t>*Data source: public dataset of “FitBit Fitness Tracker Data” from Mobius</a:t>
-            </a:r>
-            <a:endParaRPr sz="900" i="1"/>
-          </a:p>
-        </p:txBody>
-      </p:sp>
-    </p:spTree>
-  </p:cSld>
-  <p:clrMapOvr>
-    <a:masterClrMapping/>
-  </p:clrMapOvr>
-  <p:timing>
-    <p:tnLst>
-      <p:par>
-        <p:cTn id="1" dur="indefinite" restart="never" nodeType="tmRoot">
-          <p:childTnLst>
-            <p:seq concurrent="1" nextAc="seek">
-              <p:cTn id="2" dur="indefinite" nodeType="mainSeq">
-                <p:childTnLst>
-                  <p:par>
-                    <p:cTn id="3" fill="hold">
-                      <p:stCondLst>
-                        <p:cond delay="indefinite"/>
-                      </p:stCondLst>
-                      <p:childTnLst>
-                        <p:par>
-                          <p:cTn id="4" fill="hold">
-                            <p:stCondLst>
-                              <p:cond delay="0"/>
-                            </p:stCondLst>
-                            <p:childTnLst>
-                              <p:par>
-                                <p:cTn id="5" presetID="10" presetClass="entr" presetSubtype="0" fill="hold" nodeType="clickEffect">
-                                  <p:stCondLst>
-                                    <p:cond delay="0"/>
-                                  </p:stCondLst>
-                                  <p:childTnLst>
-                                    <p:set>
-                                      <p:cBhvr>
-                                        <p:cTn id="6" dur="1" fill="hold">
-                                          <p:stCondLst>
-                                            <p:cond delay="0"/>
-                                          </p:stCondLst>
-                                        </p:cTn>
-                                        <p:tgtEl>
-                                          <p:spTgt spid="148"/>
-                                        </p:tgtEl>
-                                        <p:attrNameLst>
-                                          <p:attrName>style.visibility</p:attrName>
-                                        </p:attrNameLst>
-                                      </p:cBhvr>
-                                      <p:to>
-                                        <p:strVal val="visible"/>
-                                      </p:to>
-                                    </p:set>
-                                    <p:animEffect transition="in" filter="fade">
-                                      <p:cBhvr>
-                                        <p:cTn id="7" dur="1000"/>
-                                        <p:tgtEl>
-                                          <p:spTgt spid="148"/>
                                         </p:tgtEl>
                                       </p:cBhvr>
                                     </p:animEffect>

</xml_diff>